<commit_message>
updating day 2 slides and notebooks
</commit_message>
<xml_diff>
--- a/Week11/Day2/2 - Deep Natural Language Processing.pptx
+++ b/Week11/Day2/2 - Deep Natural Language Processing.pptx
@@ -5,7 +5,7 @@
     <p:sldMasterId id="2147483660" r:id="rId1"/>
   </p:sldMasterIdLst>
   <p:notesMasterIdLst>
-    <p:notesMasterId r:id="rId18"/>
+    <p:notesMasterId r:id="rId21"/>
   </p:notesMasterIdLst>
   <p:sldIdLst>
     <p:sldId id="256" r:id="rId2"/>
@@ -13,17 +13,20 @@
     <p:sldId id="257" r:id="rId4"/>
     <p:sldId id="258" r:id="rId5"/>
     <p:sldId id="278" r:id="rId6"/>
-    <p:sldId id="280" r:id="rId7"/>
-    <p:sldId id="281" r:id="rId8"/>
-    <p:sldId id="282" r:id="rId9"/>
-    <p:sldId id="283" r:id="rId10"/>
-    <p:sldId id="284" r:id="rId11"/>
-    <p:sldId id="285" r:id="rId12"/>
-    <p:sldId id="261" r:id="rId13"/>
-    <p:sldId id="262" r:id="rId14"/>
-    <p:sldId id="263" r:id="rId15"/>
-    <p:sldId id="264" r:id="rId16"/>
-    <p:sldId id="269" r:id="rId17"/>
+    <p:sldId id="286" r:id="rId7"/>
+    <p:sldId id="280" r:id="rId8"/>
+    <p:sldId id="281" r:id="rId9"/>
+    <p:sldId id="282" r:id="rId10"/>
+    <p:sldId id="288" r:id="rId11"/>
+    <p:sldId id="287" r:id="rId12"/>
+    <p:sldId id="283" r:id="rId13"/>
+    <p:sldId id="284" r:id="rId14"/>
+    <p:sldId id="285" r:id="rId15"/>
+    <p:sldId id="261" r:id="rId16"/>
+    <p:sldId id="262" r:id="rId17"/>
+    <p:sldId id="263" r:id="rId18"/>
+    <p:sldId id="264" r:id="rId19"/>
+    <p:sldId id="269" r:id="rId20"/>
   </p:sldIdLst>
   <p:sldSz cx="12192000" cy="6858000"/>
   <p:notesSz cx="6858000" cy="9144000"/>
@@ -212,7 +215,7 @@
           <a:p>
             <a:fld id="{AD4E8CE8-1268-0D4D-B630-985A7B14906A}" type="datetimeFigureOut">
               <a:rPr lang="en-US" smtClean="0"/>
-              <a:t>10/22/21</a:t>
+              <a:t>10/28/21</a:t>
             </a:fld>
             <a:endParaRPr lang="en-US"/>
           </a:p>
@@ -1242,7 +1245,7 @@
           <a:p>
             <a:fld id="{6435F846-A229-4D46-A682-D324386B10A3}" type="datetime1">
               <a:rPr lang="en-US" smtClean="0"/>
-              <a:t>10/22/21</a:t>
+              <a:t>10/28/21</a:t>
             </a:fld>
             <a:endParaRPr lang="en-US"/>
           </a:p>
@@ -1412,7 +1415,7 @@
           <a:p>
             <a:fld id="{C36057EE-F09D-F04F-8326-60F417A2636D}" type="datetime1">
               <a:rPr lang="en-US" smtClean="0"/>
-              <a:t>10/22/21</a:t>
+              <a:t>10/28/21</a:t>
             </a:fld>
             <a:endParaRPr lang="en-US"/>
           </a:p>
@@ -1592,7 +1595,7 @@
           <a:p>
             <a:fld id="{234A95EE-6652-D84B-962A-AA2AE73349E5}" type="datetime1">
               <a:rPr lang="en-US" smtClean="0"/>
-              <a:t>10/22/21</a:t>
+              <a:t>10/28/21</a:t>
             </a:fld>
             <a:endParaRPr lang="en-US"/>
           </a:p>
@@ -1762,7 +1765,7 @@
           <a:p>
             <a:fld id="{6214D275-8E5B-B449-A3C8-1225487509B7}" type="datetime1">
               <a:rPr lang="en-US" smtClean="0"/>
-              <a:t>10/22/21</a:t>
+              <a:t>10/28/21</a:t>
             </a:fld>
             <a:endParaRPr lang="en-US"/>
           </a:p>
@@ -2008,7 +2011,7 @@
           <a:p>
             <a:fld id="{2B3C7113-3492-804B-B9C0-5BB428EC7AE8}" type="datetime1">
               <a:rPr lang="en-US" smtClean="0"/>
-              <a:t>10/22/21</a:t>
+              <a:t>10/28/21</a:t>
             </a:fld>
             <a:endParaRPr lang="en-US"/>
           </a:p>
@@ -2240,7 +2243,7 @@
           <a:p>
             <a:fld id="{CC114B0C-B645-D141-B59A-E6C2FDE7F112}" type="datetime1">
               <a:rPr lang="en-US" smtClean="0"/>
-              <a:t>10/22/21</a:t>
+              <a:t>10/28/21</a:t>
             </a:fld>
             <a:endParaRPr lang="en-US"/>
           </a:p>
@@ -2607,7 +2610,7 @@
           <a:p>
             <a:fld id="{2B3B4A25-CA08-4248-B1AF-00A0307454AA}" type="datetime1">
               <a:rPr lang="en-US" smtClean="0"/>
-              <a:t>10/22/21</a:t>
+              <a:t>10/28/21</a:t>
             </a:fld>
             <a:endParaRPr lang="en-US"/>
           </a:p>
@@ -2725,7 +2728,7 @@
           <a:p>
             <a:fld id="{163CAE9A-AFAF-F945-8ACE-4A603B8A8590}" type="datetime1">
               <a:rPr lang="en-US" smtClean="0"/>
-              <a:t>10/22/21</a:t>
+              <a:t>10/28/21</a:t>
             </a:fld>
             <a:endParaRPr lang="en-US"/>
           </a:p>
@@ -2820,7 +2823,7 @@
           <a:p>
             <a:fld id="{CEC6D82A-943D-E74D-A155-346FE774F4C0}" type="datetime1">
               <a:rPr lang="en-US" smtClean="0"/>
-              <a:t>10/22/21</a:t>
+              <a:t>10/28/21</a:t>
             </a:fld>
             <a:endParaRPr lang="en-US"/>
           </a:p>
@@ -3097,7 +3100,7 @@
           <a:p>
             <a:fld id="{58D4BA50-9DD9-C149-9597-2FC567CF019D}" type="datetime1">
               <a:rPr lang="en-US" smtClean="0"/>
-              <a:t>10/22/21</a:t>
+              <a:t>10/28/21</a:t>
             </a:fld>
             <a:endParaRPr lang="en-US"/>
           </a:p>
@@ -3354,7 +3357,7 @@
           <a:p>
             <a:fld id="{8ACBFF4F-ECC5-3D4B-A652-EEC435275837}" type="datetime1">
               <a:rPr lang="en-US" smtClean="0"/>
-              <a:t>10/22/21</a:t>
+              <a:t>10/28/21</a:t>
             </a:fld>
             <a:endParaRPr lang="en-US"/>
           </a:p>
@@ -3567,7 +3570,7 @@
           <a:p>
             <a:fld id="{9A2AC0A2-5064-8D41-AA0B-AD1D0C6A6D88}" type="datetime1">
               <a:rPr lang="en-US" smtClean="0"/>
-              <a:t>10/22/21</a:t>
+              <a:t>10/28/21</a:t>
             </a:fld>
             <a:endParaRPr lang="en-US"/>
           </a:p>
@@ -4088,10 +4091,1876 @@
       </p:grpSpPr>
       <p:sp>
         <p:nvSpPr>
+          <p:cNvPr id="3" name="Content Placeholder 2">
+            <a:extLst>
+              <a:ext uri="{FF2B5EF4-FFF2-40B4-BE49-F238E27FC236}">
+                <a16:creationId xmlns:a16="http://schemas.microsoft.com/office/drawing/2014/main" id="{57C53568-D750-AE40-BF02-FEFD4B9DC166}"/>
+              </a:ext>
+            </a:extLst>
+          </p:cNvPr>
+          <p:cNvSpPr>
+            <a:spLocks noGrp="1"/>
+          </p:cNvSpPr>
+          <p:nvPr>
+            <p:ph idx="1"/>
+          </p:nvPr>
+        </p:nvSpPr>
+        <p:spPr>
+          <a:xfrm>
+            <a:off x="838200" y="1327918"/>
+            <a:ext cx="10515600" cy="4849045"/>
+          </a:xfrm>
+        </p:spPr>
+        <p:txBody>
+          <a:bodyPr/>
+          <a:lstStyle/>
+          <a:p>
+            <a:pPr marL="0" indent="0">
+              <a:buNone/>
+            </a:pPr>
+            <a:r>
+              <a:rPr lang="en-US" b="1" dirty="0"/>
+              <a:t>LSTM</a:t>
+            </a:r>
+            <a:r>
+              <a:rPr lang="en-US" dirty="0"/>
+              <a:t> – Long Short-term Memory</a:t>
+            </a:r>
+          </a:p>
+          <a:p>
+            <a:pPr marL="0" indent="0">
+              <a:buNone/>
+            </a:pPr>
+            <a:r>
+              <a:rPr lang="en-US" b="1" dirty="0"/>
+              <a:t>GRU</a:t>
+            </a:r>
+            <a:r>
+              <a:rPr lang="en-US" dirty="0"/>
+              <a:t> – Gated Recurrent Unit</a:t>
+            </a:r>
+          </a:p>
+        </p:txBody>
+      </p:sp>
+      <p:sp>
+        <p:nvSpPr>
+          <p:cNvPr id="4" name="Slide Number Placeholder 3">
+            <a:extLst>
+              <a:ext uri="{FF2B5EF4-FFF2-40B4-BE49-F238E27FC236}">
+                <a16:creationId xmlns:a16="http://schemas.microsoft.com/office/drawing/2014/main" id="{04377EE2-5450-BE41-B3C9-9495CB899B56}"/>
+              </a:ext>
+            </a:extLst>
+          </p:cNvPr>
+          <p:cNvSpPr>
+            <a:spLocks noGrp="1"/>
+          </p:cNvSpPr>
+          <p:nvPr>
+            <p:ph type="sldNum" sz="quarter" idx="12"/>
+          </p:nvPr>
+        </p:nvSpPr>
+        <p:spPr/>
+        <p:txBody>
+          <a:bodyPr/>
+          <a:lstStyle/>
+          <a:p>
+            <a:fld id="{330EA680-D336-4FF7-8B7A-9848BB0A1C32}" type="slidenum">
+              <a:rPr lang="en-US" smtClean="0"/>
+              <a:t>10</a:t>
+            </a:fld>
+            <a:endParaRPr lang="en-US"/>
+          </a:p>
+        </p:txBody>
+      </p:sp>
+      <p:sp>
+        <p:nvSpPr>
+          <p:cNvPr id="5" name="Rectangle 4">
+            <a:extLst>
+              <a:ext uri="{FF2B5EF4-FFF2-40B4-BE49-F238E27FC236}">
+                <a16:creationId xmlns:a16="http://schemas.microsoft.com/office/drawing/2014/main" id="{FCA49D24-2525-264D-87E2-F7AF4EB4C719}"/>
+              </a:ext>
+            </a:extLst>
+          </p:cNvPr>
+          <p:cNvSpPr/>
+          <p:nvPr/>
+        </p:nvSpPr>
+        <p:spPr>
+          <a:xfrm>
+            <a:off x="1168106" y="3105835"/>
+            <a:ext cx="10474477" cy="1200329"/>
+          </a:xfrm>
+          <a:prstGeom prst="rect">
+            <a:avLst/>
+          </a:prstGeom>
+        </p:spPr>
+        <p:txBody>
+          <a:bodyPr wrap="square">
+            <a:spAutoFit/>
+          </a:bodyPr>
+          <a:lstStyle/>
+          <a:p>
+            <a:r>
+              <a:rPr lang="en-US" dirty="0"/>
+              <a:t>A </a:t>
+            </a:r>
+            <a:r>
+              <a:rPr lang="en-US" dirty="0">
+                <a:highlight>
+                  <a:srgbClr val="00FF00"/>
+                </a:highlight>
+              </a:rPr>
+              <a:t>priest</a:t>
+            </a:r>
+            <a:r>
+              <a:rPr lang="en-US" dirty="0"/>
+              <a:t> who has abandoned his ministry meets a young man who has just been ordained. This movie is about the cruel dilemma between a life dedicated to </a:t>
+            </a:r>
+            <a:r>
+              <a:rPr lang="en-US" dirty="0">
+                <a:highlight>
+                  <a:srgbClr val="00FF00"/>
+                </a:highlight>
+              </a:rPr>
+              <a:t>God</a:t>
+            </a:r>
+            <a:r>
+              <a:rPr lang="en-US" dirty="0"/>
+              <a:t> and faith and a life of more earthly pleasures. In post war France it is also about the mortal aspect of Faith itself. This may not be the movie of a lifetime but it is a sin to have allowed it to fall in oblivion. Besides, Pierre </a:t>
+            </a:r>
+            <a:r>
+              <a:rPr lang="en-US" dirty="0" err="1"/>
+              <a:t>Fresnay</a:t>
+            </a:r>
+            <a:r>
+              <a:rPr lang="en-US" dirty="0"/>
+              <a:t> is sublime.</a:t>
+            </a:r>
+            <a:endParaRPr lang="en-US" b="1" dirty="0">
+              <a:solidFill>
+                <a:srgbClr val="212121"/>
+              </a:solidFill>
+              <a:latin typeface="Courier New" panose="02070309020205020404" pitchFamily="49" charset="0"/>
+            </a:endParaRPr>
+          </a:p>
+        </p:txBody>
+      </p:sp>
+      <p:sp>
+        <p:nvSpPr>
+          <p:cNvPr id="6" name="TextBox 5">
+            <a:extLst>
+              <a:ext uri="{FF2B5EF4-FFF2-40B4-BE49-F238E27FC236}">
+                <a16:creationId xmlns:a16="http://schemas.microsoft.com/office/drawing/2014/main" id="{A769F598-2948-C84B-AFCF-141CE0080B4F}"/>
+              </a:ext>
+            </a:extLst>
+          </p:cNvPr>
+          <p:cNvSpPr txBox="1"/>
+          <p:nvPr/>
+        </p:nvSpPr>
+        <p:spPr>
+          <a:xfrm>
+            <a:off x="262089" y="5712659"/>
+            <a:ext cx="1021433" cy="369332"/>
+          </a:xfrm>
+          <a:prstGeom prst="rect">
+            <a:avLst/>
+          </a:prstGeom>
+          <a:noFill/>
+        </p:spPr>
+        <p:txBody>
+          <a:bodyPr wrap="none" rtlCol="0">
+            <a:spAutoFit/>
+          </a:bodyPr>
+          <a:lstStyle/>
+          <a:p>
+            <a:r>
+              <a:rPr lang="en-US" dirty="0"/>
+              <a:t>Label = 0</a:t>
+            </a:r>
+          </a:p>
+        </p:txBody>
+      </p:sp>
+      <p:sp>
+        <p:nvSpPr>
+          <p:cNvPr id="7" name="TextBox 6">
+            <a:extLst>
+              <a:ext uri="{FF2B5EF4-FFF2-40B4-BE49-F238E27FC236}">
+                <a16:creationId xmlns:a16="http://schemas.microsoft.com/office/drawing/2014/main" id="{18C3F31E-3E86-4F49-854E-9274E2686043}"/>
+              </a:ext>
+            </a:extLst>
+          </p:cNvPr>
+          <p:cNvSpPr txBox="1"/>
+          <p:nvPr/>
+        </p:nvSpPr>
+        <p:spPr>
+          <a:xfrm>
+            <a:off x="262089" y="3558589"/>
+            <a:ext cx="906017" cy="369332"/>
+          </a:xfrm>
+          <a:prstGeom prst="rect">
+            <a:avLst/>
+          </a:prstGeom>
+          <a:noFill/>
+        </p:spPr>
+        <p:txBody>
+          <a:bodyPr wrap="none" rtlCol="0">
+            <a:spAutoFit/>
+          </a:bodyPr>
+          <a:lstStyle/>
+          <a:p>
+            <a:r>
+              <a:rPr lang="en-US" dirty="0"/>
+              <a:t>Input = </a:t>
+            </a:r>
+          </a:p>
+        </p:txBody>
+      </p:sp>
+    </p:spTree>
+    <p:extLst>
+      <p:ext uri="{BB962C8B-B14F-4D97-AF65-F5344CB8AC3E}">
+        <p14:creationId xmlns:p14="http://schemas.microsoft.com/office/powerpoint/2010/main" val="233554432"/>
+      </p:ext>
+    </p:extLst>
+  </p:cSld>
+  <p:clrMapOvr>
+    <a:masterClrMapping/>
+  </p:clrMapOvr>
+</p:sld>
+</file>
+
+<file path=ppt/slides/slide11.xml><?xml version="1.0" encoding="utf-8"?>
+<p:sld xmlns:a="http://schemas.openxmlformats.org/drawingml/2006/main" xmlns:r="http://schemas.openxmlformats.org/officeDocument/2006/relationships" xmlns:p="http://schemas.openxmlformats.org/presentationml/2006/main">
+  <p:cSld>
+    <p:spTree>
+      <p:nvGrpSpPr>
+        <p:cNvPr id="1" name=""/>
+        <p:cNvGrpSpPr/>
+        <p:nvPr/>
+      </p:nvGrpSpPr>
+      <p:grpSpPr>
+        <a:xfrm>
+          <a:off x="0" y="0"/>
+          <a:ext cx="0" cy="0"/>
+          <a:chOff x="0" y="0"/>
+          <a:chExt cx="0" cy="0"/>
+        </a:xfrm>
+      </p:grpSpPr>
+      <p:pic>
+        <p:nvPicPr>
+          <p:cNvPr id="5" name="Picture 2" descr="A drawing of the information flow in the model">
+            <a:extLst>
+              <a:ext uri="{FF2B5EF4-FFF2-40B4-BE49-F238E27FC236}">
+                <a16:creationId xmlns:a16="http://schemas.microsoft.com/office/drawing/2014/main" id="{10599DE0-EC92-444A-A0E5-E3C414A1E394}"/>
+              </a:ext>
+            </a:extLst>
+          </p:cNvPr>
+          <p:cNvPicPr>
+            <a:picLocks noChangeAspect="1" noChangeArrowheads="1"/>
+          </p:cNvPicPr>
+          <p:nvPr/>
+        </p:nvPicPr>
+        <p:blipFill>
+          <a:blip r:embed="rId2">
+            <a:extLst>
+              <a:ext uri="{28A0092B-C50C-407E-A947-70E740481C1C}">
+                <a14:useLocalDpi xmlns:a14="http://schemas.microsoft.com/office/drawing/2010/main" val="0"/>
+              </a:ext>
+            </a:extLst>
+          </a:blip>
+          <a:srcRect/>
+          <a:stretch>
+            <a:fillRect/>
+          </a:stretch>
+        </p:blipFill>
+        <p:spPr bwMode="auto">
+          <a:xfrm>
+            <a:off x="-140923" y="1696445"/>
+            <a:ext cx="4850099" cy="5124097"/>
+          </a:xfrm>
+          <a:prstGeom prst="rect">
+            <a:avLst/>
+          </a:prstGeom>
+          <a:noFill/>
+          <a:extLst>
+            <a:ext uri="{909E8E84-426E-40DD-AFC4-6F175D3DCCD1}">
+              <a14:hiddenFill xmlns:a14="http://schemas.microsoft.com/office/drawing/2010/main">
+                <a:solidFill>
+                  <a:srgbClr val="FFFFFF"/>
+                </a:solidFill>
+              </a14:hiddenFill>
+            </a:ext>
+          </a:extLst>
+        </p:spPr>
+      </p:pic>
+      <p:sp>
+        <p:nvSpPr>
+          <p:cNvPr id="6" name="Rectangle 5">
+            <a:extLst>
+              <a:ext uri="{FF2B5EF4-FFF2-40B4-BE49-F238E27FC236}">
+                <a16:creationId xmlns:a16="http://schemas.microsoft.com/office/drawing/2014/main" id="{3EDF80FD-B660-0945-BC95-558936FF9402}"/>
+              </a:ext>
+            </a:extLst>
+          </p:cNvPr>
+          <p:cNvSpPr/>
+          <p:nvPr/>
+        </p:nvSpPr>
+        <p:spPr>
+          <a:xfrm>
+            <a:off x="3185839" y="3428999"/>
+            <a:ext cx="1071654" cy="414975"/>
+          </a:xfrm>
+          <a:prstGeom prst="rect">
+            <a:avLst/>
+          </a:prstGeom>
+          <a:noFill/>
+        </p:spPr>
+        <p:style>
+          <a:lnRef idx="2">
+            <a:schemeClr val="accent1">
+              <a:shade val="50000"/>
+            </a:schemeClr>
+          </a:lnRef>
+          <a:fillRef idx="1">
+            <a:schemeClr val="accent1"/>
+          </a:fillRef>
+          <a:effectRef idx="0">
+            <a:schemeClr val="accent1"/>
+          </a:effectRef>
+          <a:fontRef idx="minor">
+            <a:schemeClr val="lt1"/>
+          </a:fontRef>
+        </p:style>
+        <p:txBody>
+          <a:bodyPr rtlCol="0" anchor="ctr"/>
+          <a:lstStyle/>
+          <a:p>
+            <a:pPr algn="ctr"/>
+            <a:endParaRPr lang="en-US"/>
+          </a:p>
+        </p:txBody>
+      </p:sp>
+      <p:sp>
+        <p:nvSpPr>
+          <p:cNvPr id="7" name="TextBox 6">
+            <a:extLst>
+              <a:ext uri="{FF2B5EF4-FFF2-40B4-BE49-F238E27FC236}">
+                <a16:creationId xmlns:a16="http://schemas.microsoft.com/office/drawing/2014/main" id="{2A4C9318-9704-D243-BB08-3692B8C77C4D}"/>
+              </a:ext>
+            </a:extLst>
+          </p:cNvPr>
+          <p:cNvSpPr txBox="1"/>
+          <p:nvPr/>
+        </p:nvSpPr>
+        <p:spPr>
+          <a:xfrm>
+            <a:off x="2556826" y="5503873"/>
+            <a:ext cx="418704" cy="369332"/>
+          </a:xfrm>
+          <a:prstGeom prst="rect">
+            <a:avLst/>
+          </a:prstGeom>
+          <a:noFill/>
+        </p:spPr>
+        <p:txBody>
+          <a:bodyPr wrap="none" rtlCol="0">
+            <a:spAutoFit/>
+          </a:bodyPr>
+          <a:lstStyle/>
+          <a:p>
+            <a:r>
+              <a:rPr lang="en-US" dirty="0"/>
+              <a:t>64</a:t>
+            </a:r>
+          </a:p>
+        </p:txBody>
+      </p:sp>
+      <p:sp>
+        <p:nvSpPr>
+          <p:cNvPr id="8" name="TextBox 7">
+            <a:extLst>
+              <a:ext uri="{FF2B5EF4-FFF2-40B4-BE49-F238E27FC236}">
+                <a16:creationId xmlns:a16="http://schemas.microsoft.com/office/drawing/2014/main" id="{8EFFD654-DAA5-D942-82B6-20469A7665A5}"/>
+              </a:ext>
+            </a:extLst>
+          </p:cNvPr>
+          <p:cNvSpPr txBox="1"/>
+          <p:nvPr/>
+        </p:nvSpPr>
+        <p:spPr>
+          <a:xfrm>
+            <a:off x="2511941" y="6231898"/>
+            <a:ext cx="508473" cy="369332"/>
+          </a:xfrm>
+          <a:prstGeom prst="rect">
+            <a:avLst/>
+          </a:prstGeom>
+          <a:noFill/>
+        </p:spPr>
+        <p:txBody>
+          <a:bodyPr wrap="none" rtlCol="0">
+            <a:spAutoFit/>
+          </a:bodyPr>
+          <a:lstStyle/>
+          <a:p>
+            <a:r>
+              <a:rPr lang="en-US" dirty="0"/>
+              <a:t>0/1</a:t>
+            </a:r>
+          </a:p>
+        </p:txBody>
+      </p:sp>
+      <p:sp>
+        <p:nvSpPr>
+          <p:cNvPr id="9" name="TextBox 8">
+            <a:extLst>
+              <a:ext uri="{FF2B5EF4-FFF2-40B4-BE49-F238E27FC236}">
+                <a16:creationId xmlns:a16="http://schemas.microsoft.com/office/drawing/2014/main" id="{FBB5178D-C135-3B40-9EF0-1022678CA1E5}"/>
+              </a:ext>
+            </a:extLst>
+          </p:cNvPr>
+          <p:cNvSpPr txBox="1"/>
+          <p:nvPr/>
+        </p:nvSpPr>
+        <p:spPr>
+          <a:xfrm>
+            <a:off x="1654975" y="1549690"/>
+            <a:ext cx="1111202" cy="369332"/>
+          </a:xfrm>
+          <a:prstGeom prst="rect">
+            <a:avLst/>
+          </a:prstGeom>
+          <a:noFill/>
+        </p:spPr>
+        <p:txBody>
+          <a:bodyPr wrap="none" rtlCol="0">
+            <a:spAutoFit/>
+          </a:bodyPr>
+          <a:lstStyle/>
+          <a:p>
+            <a:r>
+              <a:rPr lang="en-US" dirty="0">
+                <a:solidFill>
+                  <a:srgbClr val="FF0000"/>
+                </a:solidFill>
+              </a:rPr>
+              <a:t>bad = 120</a:t>
+            </a:r>
+          </a:p>
+        </p:txBody>
+      </p:sp>
+      <p:sp>
+        <p:nvSpPr>
+          <p:cNvPr id="10" name="TextBox 9">
+            <a:extLst>
+              <a:ext uri="{FF2B5EF4-FFF2-40B4-BE49-F238E27FC236}">
+                <a16:creationId xmlns:a16="http://schemas.microsoft.com/office/drawing/2014/main" id="{9F53F220-EB0C-1342-99C2-F8285A06BED5}"/>
+              </a:ext>
+            </a:extLst>
+          </p:cNvPr>
+          <p:cNvSpPr txBox="1"/>
+          <p:nvPr/>
+        </p:nvSpPr>
+        <p:spPr>
+          <a:xfrm>
+            <a:off x="0" y="3664329"/>
+            <a:ext cx="3143809" cy="261610"/>
+          </a:xfrm>
+          <a:prstGeom prst="rect">
+            <a:avLst/>
+          </a:prstGeom>
+          <a:noFill/>
+        </p:spPr>
+        <p:txBody>
+          <a:bodyPr wrap="none" rtlCol="0">
+            <a:spAutoFit/>
+          </a:bodyPr>
+          <a:lstStyle/>
+          <a:p>
+            <a:r>
+              <a:rPr lang="en-US" sz="1100" dirty="0"/>
+              <a:t>1x64  [………..]   [………..]   [………..]  </a:t>
+            </a:r>
+            <a:r>
+              <a:rPr lang="en-US" sz="1100" dirty="0">
+                <a:highlight>
+                  <a:srgbClr val="00FF00"/>
+                </a:highlight>
+              </a:rPr>
+              <a:t>[………..]</a:t>
+            </a:r>
+            <a:r>
+              <a:rPr lang="en-US" sz="1100" dirty="0"/>
+              <a:t>   [………..]</a:t>
+            </a:r>
+          </a:p>
+        </p:txBody>
+      </p:sp>
+      <p:sp>
+        <p:nvSpPr>
+          <p:cNvPr id="11" name="TextBox 10">
+            <a:extLst>
+              <a:ext uri="{FF2B5EF4-FFF2-40B4-BE49-F238E27FC236}">
+                <a16:creationId xmlns:a16="http://schemas.microsoft.com/office/drawing/2014/main" id="{1470DF93-8B56-8C4A-BF07-71C903780FC4}"/>
+              </a:ext>
+            </a:extLst>
+          </p:cNvPr>
+          <p:cNvSpPr txBox="1"/>
+          <p:nvPr/>
+        </p:nvSpPr>
+        <p:spPr>
+          <a:xfrm>
+            <a:off x="576597" y="4186612"/>
+            <a:ext cx="301686" cy="369332"/>
+          </a:xfrm>
+          <a:prstGeom prst="rect">
+            <a:avLst/>
+          </a:prstGeom>
+          <a:noFill/>
+        </p:spPr>
+        <p:txBody>
+          <a:bodyPr wrap="none" rtlCol="0">
+            <a:spAutoFit/>
+          </a:bodyPr>
+          <a:lstStyle/>
+          <a:p>
+            <a:r>
+              <a:rPr lang="en-US" dirty="0">
+                <a:solidFill>
+                  <a:srgbClr val="FF0000"/>
+                </a:solidFill>
+              </a:rPr>
+              <a:t>1</a:t>
+            </a:r>
+          </a:p>
+        </p:txBody>
+      </p:sp>
+      <p:sp>
+        <p:nvSpPr>
+          <p:cNvPr id="12" name="TextBox 11">
+            <a:extLst>
+              <a:ext uri="{FF2B5EF4-FFF2-40B4-BE49-F238E27FC236}">
+                <a16:creationId xmlns:a16="http://schemas.microsoft.com/office/drawing/2014/main" id="{A538B21B-94E7-5846-AFC8-B3D5DAD4DE49}"/>
+              </a:ext>
+            </a:extLst>
+          </p:cNvPr>
+          <p:cNvSpPr txBox="1"/>
+          <p:nvPr/>
+        </p:nvSpPr>
+        <p:spPr>
+          <a:xfrm>
+            <a:off x="1108295" y="4182205"/>
+            <a:ext cx="301686" cy="369332"/>
+          </a:xfrm>
+          <a:prstGeom prst="rect">
+            <a:avLst/>
+          </a:prstGeom>
+          <a:noFill/>
+        </p:spPr>
+        <p:txBody>
+          <a:bodyPr wrap="none" rtlCol="0">
+            <a:spAutoFit/>
+          </a:bodyPr>
+          <a:lstStyle/>
+          <a:p>
+            <a:r>
+              <a:rPr lang="en-US" dirty="0">
+                <a:solidFill>
+                  <a:srgbClr val="FF0000"/>
+                </a:solidFill>
+              </a:rPr>
+              <a:t>2</a:t>
+            </a:r>
+          </a:p>
+        </p:txBody>
+      </p:sp>
+      <p:sp>
+        <p:nvSpPr>
+          <p:cNvPr id="13" name="TextBox 12">
+            <a:extLst>
+              <a:ext uri="{FF2B5EF4-FFF2-40B4-BE49-F238E27FC236}">
+                <a16:creationId xmlns:a16="http://schemas.microsoft.com/office/drawing/2014/main" id="{9FC33A28-269D-084A-A3C3-F15E2B674370}"/>
+              </a:ext>
+            </a:extLst>
+          </p:cNvPr>
+          <p:cNvSpPr txBox="1"/>
+          <p:nvPr/>
+        </p:nvSpPr>
+        <p:spPr>
+          <a:xfrm>
+            <a:off x="1642426" y="4186612"/>
+            <a:ext cx="301686" cy="369332"/>
+          </a:xfrm>
+          <a:prstGeom prst="rect">
+            <a:avLst/>
+          </a:prstGeom>
+          <a:noFill/>
+        </p:spPr>
+        <p:txBody>
+          <a:bodyPr wrap="none" rtlCol="0">
+            <a:spAutoFit/>
+          </a:bodyPr>
+          <a:lstStyle/>
+          <a:p>
+            <a:r>
+              <a:rPr lang="en-US" dirty="0">
+                <a:solidFill>
+                  <a:srgbClr val="FF0000"/>
+                </a:solidFill>
+              </a:rPr>
+              <a:t>3</a:t>
+            </a:r>
+          </a:p>
+        </p:txBody>
+      </p:sp>
+      <p:sp>
+        <p:nvSpPr>
+          <p:cNvPr id="14" name="TextBox 13">
+            <a:extLst>
+              <a:ext uri="{FF2B5EF4-FFF2-40B4-BE49-F238E27FC236}">
+                <a16:creationId xmlns:a16="http://schemas.microsoft.com/office/drawing/2014/main" id="{313AEEBF-986B-9341-A9F7-D0D2392757F8}"/>
+              </a:ext>
+            </a:extLst>
+          </p:cNvPr>
+          <p:cNvSpPr txBox="1"/>
+          <p:nvPr/>
+        </p:nvSpPr>
+        <p:spPr>
+          <a:xfrm>
+            <a:off x="2167298" y="4186638"/>
+            <a:ext cx="301686" cy="369332"/>
+          </a:xfrm>
+          <a:prstGeom prst="rect">
+            <a:avLst/>
+          </a:prstGeom>
+          <a:noFill/>
+        </p:spPr>
+        <p:txBody>
+          <a:bodyPr wrap="none" rtlCol="0">
+            <a:spAutoFit/>
+          </a:bodyPr>
+          <a:lstStyle/>
+          <a:p>
+            <a:r>
+              <a:rPr lang="en-US" dirty="0">
+                <a:solidFill>
+                  <a:srgbClr val="FF0000"/>
+                </a:solidFill>
+              </a:rPr>
+              <a:t>4</a:t>
+            </a:r>
+          </a:p>
+        </p:txBody>
+      </p:sp>
+      <p:sp>
+        <p:nvSpPr>
+          <p:cNvPr id="15" name="TextBox 14">
+            <a:extLst>
+              <a:ext uri="{FF2B5EF4-FFF2-40B4-BE49-F238E27FC236}">
+                <a16:creationId xmlns:a16="http://schemas.microsoft.com/office/drawing/2014/main" id="{9329F7D2-A592-B54D-A426-E575552C25E8}"/>
+              </a:ext>
+            </a:extLst>
+          </p:cNvPr>
+          <p:cNvSpPr txBox="1"/>
+          <p:nvPr/>
+        </p:nvSpPr>
+        <p:spPr>
+          <a:xfrm>
+            <a:off x="2703124" y="4190454"/>
+            <a:ext cx="301686" cy="369332"/>
+          </a:xfrm>
+          <a:prstGeom prst="rect">
+            <a:avLst/>
+          </a:prstGeom>
+          <a:noFill/>
+        </p:spPr>
+        <p:txBody>
+          <a:bodyPr wrap="none" rtlCol="0">
+            <a:spAutoFit/>
+          </a:bodyPr>
+          <a:lstStyle/>
+          <a:p>
+            <a:r>
+              <a:rPr lang="en-US" dirty="0">
+                <a:solidFill>
+                  <a:srgbClr val="FF0000"/>
+                </a:solidFill>
+              </a:rPr>
+              <a:t>5</a:t>
+            </a:r>
+          </a:p>
+        </p:txBody>
+      </p:sp>
+      <p:sp>
+        <p:nvSpPr>
+          <p:cNvPr id="19" name="TextBox 18">
+            <a:extLst>
+              <a:ext uri="{FF2B5EF4-FFF2-40B4-BE49-F238E27FC236}">
+                <a16:creationId xmlns:a16="http://schemas.microsoft.com/office/drawing/2014/main" id="{94FF8873-F7B5-764E-AA3E-12A997228938}"/>
+              </a:ext>
+            </a:extLst>
+          </p:cNvPr>
+          <p:cNvSpPr txBox="1"/>
+          <p:nvPr/>
+        </p:nvSpPr>
+        <p:spPr>
+          <a:xfrm>
+            <a:off x="419344" y="4728263"/>
+            <a:ext cx="301686" cy="369332"/>
+          </a:xfrm>
+          <a:prstGeom prst="rect">
+            <a:avLst/>
+          </a:prstGeom>
+          <a:noFill/>
+        </p:spPr>
+        <p:txBody>
+          <a:bodyPr wrap="none" rtlCol="0">
+            <a:spAutoFit/>
+          </a:bodyPr>
+          <a:lstStyle/>
+          <a:p>
+            <a:r>
+              <a:rPr lang="en-US" dirty="0">
+                <a:solidFill>
+                  <a:srgbClr val="FF0000"/>
+                </a:solidFill>
+              </a:rPr>
+              <a:t>1</a:t>
+            </a:r>
+          </a:p>
+        </p:txBody>
+      </p:sp>
+      <p:sp>
+        <p:nvSpPr>
+          <p:cNvPr id="20" name="TextBox 19">
+            <a:extLst>
+              <a:ext uri="{FF2B5EF4-FFF2-40B4-BE49-F238E27FC236}">
+                <a16:creationId xmlns:a16="http://schemas.microsoft.com/office/drawing/2014/main" id="{FFB00774-EE8A-094C-A8A4-8B3C9040F9A3}"/>
+              </a:ext>
+            </a:extLst>
+          </p:cNvPr>
+          <p:cNvSpPr txBox="1"/>
+          <p:nvPr/>
+        </p:nvSpPr>
+        <p:spPr>
+          <a:xfrm>
+            <a:off x="951042" y="4723856"/>
+            <a:ext cx="301686" cy="369332"/>
+          </a:xfrm>
+          <a:prstGeom prst="rect">
+            <a:avLst/>
+          </a:prstGeom>
+          <a:noFill/>
+        </p:spPr>
+        <p:txBody>
+          <a:bodyPr wrap="none" rtlCol="0">
+            <a:spAutoFit/>
+          </a:bodyPr>
+          <a:lstStyle/>
+          <a:p>
+            <a:r>
+              <a:rPr lang="en-US" dirty="0">
+                <a:solidFill>
+                  <a:srgbClr val="FF0000"/>
+                </a:solidFill>
+              </a:rPr>
+              <a:t>2</a:t>
+            </a:r>
+          </a:p>
+        </p:txBody>
+      </p:sp>
+      <p:sp>
+        <p:nvSpPr>
+          <p:cNvPr id="21" name="TextBox 20">
+            <a:extLst>
+              <a:ext uri="{FF2B5EF4-FFF2-40B4-BE49-F238E27FC236}">
+                <a16:creationId xmlns:a16="http://schemas.microsoft.com/office/drawing/2014/main" id="{879EA778-540C-0846-993A-87B7E4369304}"/>
+              </a:ext>
+            </a:extLst>
+          </p:cNvPr>
+          <p:cNvSpPr txBox="1"/>
+          <p:nvPr/>
+        </p:nvSpPr>
+        <p:spPr>
+          <a:xfrm>
+            <a:off x="1485173" y="4728263"/>
+            <a:ext cx="301686" cy="369332"/>
+          </a:xfrm>
+          <a:prstGeom prst="rect">
+            <a:avLst/>
+          </a:prstGeom>
+          <a:noFill/>
+        </p:spPr>
+        <p:txBody>
+          <a:bodyPr wrap="none" rtlCol="0">
+            <a:spAutoFit/>
+          </a:bodyPr>
+          <a:lstStyle/>
+          <a:p>
+            <a:r>
+              <a:rPr lang="en-US" dirty="0">
+                <a:solidFill>
+                  <a:srgbClr val="FF0000"/>
+                </a:solidFill>
+              </a:rPr>
+              <a:t>3</a:t>
+            </a:r>
+          </a:p>
+        </p:txBody>
+      </p:sp>
+      <p:sp>
+        <p:nvSpPr>
+          <p:cNvPr id="22" name="TextBox 21">
+            <a:extLst>
+              <a:ext uri="{FF2B5EF4-FFF2-40B4-BE49-F238E27FC236}">
+                <a16:creationId xmlns:a16="http://schemas.microsoft.com/office/drawing/2014/main" id="{FDDCCD9A-F1BA-9F47-8F3B-8AB6CF0F550D}"/>
+              </a:ext>
+            </a:extLst>
+          </p:cNvPr>
+          <p:cNvSpPr txBox="1"/>
+          <p:nvPr/>
+        </p:nvSpPr>
+        <p:spPr>
+          <a:xfrm>
+            <a:off x="2010045" y="4728289"/>
+            <a:ext cx="301686" cy="369332"/>
+          </a:xfrm>
+          <a:prstGeom prst="rect">
+            <a:avLst/>
+          </a:prstGeom>
+          <a:noFill/>
+        </p:spPr>
+        <p:txBody>
+          <a:bodyPr wrap="none" rtlCol="0">
+            <a:spAutoFit/>
+          </a:bodyPr>
+          <a:lstStyle/>
+          <a:p>
+            <a:r>
+              <a:rPr lang="en-US" dirty="0">
+                <a:solidFill>
+                  <a:srgbClr val="FF0000"/>
+                </a:solidFill>
+              </a:rPr>
+              <a:t>4</a:t>
+            </a:r>
+          </a:p>
+        </p:txBody>
+      </p:sp>
+      <p:sp>
+        <p:nvSpPr>
+          <p:cNvPr id="23" name="TextBox 22">
+            <a:extLst>
+              <a:ext uri="{FF2B5EF4-FFF2-40B4-BE49-F238E27FC236}">
+                <a16:creationId xmlns:a16="http://schemas.microsoft.com/office/drawing/2014/main" id="{31B2F773-0A6B-7E4F-868E-5DFE84C203E1}"/>
+              </a:ext>
+            </a:extLst>
+          </p:cNvPr>
+          <p:cNvSpPr txBox="1"/>
+          <p:nvPr/>
+        </p:nvSpPr>
+        <p:spPr>
+          <a:xfrm>
+            <a:off x="2545871" y="4732105"/>
+            <a:ext cx="301686" cy="369332"/>
+          </a:xfrm>
+          <a:prstGeom prst="rect">
+            <a:avLst/>
+          </a:prstGeom>
+          <a:noFill/>
+        </p:spPr>
+        <p:txBody>
+          <a:bodyPr wrap="none" rtlCol="0">
+            <a:spAutoFit/>
+          </a:bodyPr>
+          <a:lstStyle/>
+          <a:p>
+            <a:r>
+              <a:rPr lang="en-US" dirty="0">
+                <a:solidFill>
+                  <a:srgbClr val="FF0000"/>
+                </a:solidFill>
+              </a:rPr>
+              <a:t>5</a:t>
+            </a:r>
+          </a:p>
+        </p:txBody>
+      </p:sp>
+      <p:sp>
+        <p:nvSpPr>
+          <p:cNvPr id="24" name="TextBox 23">
+            <a:extLst>
+              <a:ext uri="{FF2B5EF4-FFF2-40B4-BE49-F238E27FC236}">
+                <a16:creationId xmlns:a16="http://schemas.microsoft.com/office/drawing/2014/main" id="{AEAF3E37-4485-C341-BC5F-210A1FFA1B9F}"/>
+              </a:ext>
+            </a:extLst>
+          </p:cNvPr>
+          <p:cNvSpPr txBox="1"/>
+          <p:nvPr/>
+        </p:nvSpPr>
+        <p:spPr>
+          <a:xfrm>
+            <a:off x="4502323" y="3451820"/>
+            <a:ext cx="2332113" cy="369332"/>
+          </a:xfrm>
+          <a:prstGeom prst="rect">
+            <a:avLst/>
+          </a:prstGeom>
+          <a:noFill/>
+        </p:spPr>
+        <p:txBody>
+          <a:bodyPr wrap="none" rtlCol="0">
+            <a:spAutoFit/>
+          </a:bodyPr>
+          <a:lstStyle/>
+          <a:p>
+            <a:r>
+              <a:rPr lang="en-US" dirty="0"/>
+              <a:t>“</a:t>
+            </a:r>
+            <a:r>
+              <a:rPr lang="en-US" dirty="0">
+                <a:solidFill>
+                  <a:schemeClr val="accent2"/>
+                </a:solidFill>
+              </a:rPr>
+              <a:t>Learnable</a:t>
+            </a:r>
+            <a:r>
+              <a:rPr lang="en-US" dirty="0"/>
+              <a:t>” Parameter</a:t>
+            </a:r>
+          </a:p>
+        </p:txBody>
+      </p:sp>
+      <p:sp>
+        <p:nvSpPr>
+          <p:cNvPr id="25" name="TextBox 24">
+            <a:extLst>
+              <a:ext uri="{FF2B5EF4-FFF2-40B4-BE49-F238E27FC236}">
+                <a16:creationId xmlns:a16="http://schemas.microsoft.com/office/drawing/2014/main" id="{08979114-6D01-BD46-9B63-114583C1E2FC}"/>
+              </a:ext>
+            </a:extLst>
+          </p:cNvPr>
+          <p:cNvSpPr txBox="1"/>
+          <p:nvPr/>
+        </p:nvSpPr>
+        <p:spPr>
+          <a:xfrm>
+            <a:off x="4531445" y="4454087"/>
+            <a:ext cx="2142959" cy="369332"/>
+          </a:xfrm>
+          <a:prstGeom prst="rect">
+            <a:avLst/>
+          </a:prstGeom>
+          <a:noFill/>
+        </p:spPr>
+        <p:txBody>
+          <a:bodyPr wrap="none" rtlCol="0">
+            <a:spAutoFit/>
+          </a:bodyPr>
+          <a:lstStyle/>
+          <a:p>
+            <a:r>
+              <a:rPr lang="en-US" dirty="0"/>
+              <a:t>Learnable Parameter</a:t>
+            </a:r>
+          </a:p>
+        </p:txBody>
+      </p:sp>
+      <p:sp>
+        <p:nvSpPr>
+          <p:cNvPr id="26" name="TextBox 25">
+            <a:extLst>
+              <a:ext uri="{FF2B5EF4-FFF2-40B4-BE49-F238E27FC236}">
+                <a16:creationId xmlns:a16="http://schemas.microsoft.com/office/drawing/2014/main" id="{E96A29A6-C9C8-6F4D-B2D1-C62BB005E9EA}"/>
+              </a:ext>
+            </a:extLst>
+          </p:cNvPr>
+          <p:cNvSpPr txBox="1"/>
+          <p:nvPr/>
+        </p:nvSpPr>
+        <p:spPr>
+          <a:xfrm>
+            <a:off x="4531445" y="5426224"/>
+            <a:ext cx="2142959" cy="369332"/>
+          </a:xfrm>
+          <a:prstGeom prst="rect">
+            <a:avLst/>
+          </a:prstGeom>
+          <a:noFill/>
+        </p:spPr>
+        <p:txBody>
+          <a:bodyPr wrap="none" rtlCol="0">
+            <a:spAutoFit/>
+          </a:bodyPr>
+          <a:lstStyle/>
+          <a:p>
+            <a:r>
+              <a:rPr lang="en-US" dirty="0"/>
+              <a:t>Learnable Parameter</a:t>
+            </a:r>
+          </a:p>
+        </p:txBody>
+      </p:sp>
+      <p:sp>
+        <p:nvSpPr>
+          <p:cNvPr id="27" name="TextBox 26">
+            <a:extLst>
+              <a:ext uri="{FF2B5EF4-FFF2-40B4-BE49-F238E27FC236}">
+                <a16:creationId xmlns:a16="http://schemas.microsoft.com/office/drawing/2014/main" id="{DAEDEAA4-BBDB-6B41-9721-1C73646A9D7D}"/>
+              </a:ext>
+            </a:extLst>
+          </p:cNvPr>
+          <p:cNvSpPr txBox="1"/>
+          <p:nvPr/>
+        </p:nvSpPr>
+        <p:spPr>
+          <a:xfrm>
+            <a:off x="4519797" y="6195019"/>
+            <a:ext cx="2142959" cy="369332"/>
+          </a:xfrm>
+          <a:prstGeom prst="rect">
+            <a:avLst/>
+          </a:prstGeom>
+          <a:noFill/>
+        </p:spPr>
+        <p:txBody>
+          <a:bodyPr wrap="none" rtlCol="0">
+            <a:spAutoFit/>
+          </a:bodyPr>
+          <a:lstStyle/>
+          <a:p>
+            <a:r>
+              <a:rPr lang="en-US" dirty="0"/>
+              <a:t>Learnable Parameter</a:t>
+            </a:r>
+          </a:p>
+        </p:txBody>
+      </p:sp>
+      <p:sp>
+        <p:nvSpPr>
+          <p:cNvPr id="28" name="TextBox 27">
+            <a:extLst>
+              <a:ext uri="{FF2B5EF4-FFF2-40B4-BE49-F238E27FC236}">
+                <a16:creationId xmlns:a16="http://schemas.microsoft.com/office/drawing/2014/main" id="{70BD6EEE-5546-5F43-AE0A-0BF7A62C1D87}"/>
+              </a:ext>
+            </a:extLst>
+          </p:cNvPr>
+          <p:cNvSpPr txBox="1"/>
+          <p:nvPr/>
+        </p:nvSpPr>
+        <p:spPr>
+          <a:xfrm>
+            <a:off x="7289231" y="4823419"/>
+            <a:ext cx="1832746" cy="369332"/>
+          </a:xfrm>
+          <a:prstGeom prst="rect">
+            <a:avLst/>
+          </a:prstGeom>
+          <a:noFill/>
+        </p:spPr>
+        <p:txBody>
+          <a:bodyPr wrap="none" rtlCol="0">
+            <a:spAutoFit/>
+          </a:bodyPr>
+          <a:lstStyle/>
+          <a:p>
+            <a:r>
+              <a:rPr lang="en-US" dirty="0">
+                <a:highlight>
+                  <a:srgbClr val="008080"/>
+                </a:highlight>
+              </a:rPr>
+              <a:t>Optimizer - Adam</a:t>
+            </a:r>
+          </a:p>
+        </p:txBody>
+      </p:sp>
+      <p:sp>
+        <p:nvSpPr>
+          <p:cNvPr id="29" name="Right Brace 28">
+            <a:extLst>
+              <a:ext uri="{FF2B5EF4-FFF2-40B4-BE49-F238E27FC236}">
+                <a16:creationId xmlns:a16="http://schemas.microsoft.com/office/drawing/2014/main" id="{9566ECAD-2925-A14C-AE3D-04DFD8EED576}"/>
+              </a:ext>
+            </a:extLst>
+          </p:cNvPr>
+          <p:cNvSpPr/>
+          <p:nvPr/>
+        </p:nvSpPr>
+        <p:spPr>
+          <a:xfrm>
+            <a:off x="6834436" y="3636486"/>
+            <a:ext cx="470369" cy="2780078"/>
+          </a:xfrm>
+          <a:prstGeom prst="rightBrace">
+            <a:avLst/>
+          </a:prstGeom>
+        </p:spPr>
+        <p:style>
+          <a:lnRef idx="1">
+            <a:schemeClr val="accent1"/>
+          </a:lnRef>
+          <a:fillRef idx="0">
+            <a:schemeClr val="accent1"/>
+          </a:fillRef>
+          <a:effectRef idx="0">
+            <a:schemeClr val="accent1"/>
+          </a:effectRef>
+          <a:fontRef idx="minor">
+            <a:schemeClr val="tx1"/>
+          </a:fontRef>
+        </p:style>
+        <p:txBody>
+          <a:bodyPr rtlCol="0" anchor="ctr"/>
+          <a:lstStyle/>
+          <a:p>
+            <a:pPr algn="ctr"/>
+            <a:endParaRPr lang="en-US"/>
+          </a:p>
+        </p:txBody>
+      </p:sp>
+      <p:sp>
+        <p:nvSpPr>
+          <p:cNvPr id="30" name="Rectangle 29">
+            <a:extLst>
+              <a:ext uri="{FF2B5EF4-FFF2-40B4-BE49-F238E27FC236}">
+                <a16:creationId xmlns:a16="http://schemas.microsoft.com/office/drawing/2014/main" id="{92045A29-5257-3C4C-9E20-6BFD34C2CE56}"/>
+              </a:ext>
+            </a:extLst>
+          </p:cNvPr>
+          <p:cNvSpPr/>
+          <p:nvPr/>
+        </p:nvSpPr>
+        <p:spPr>
+          <a:xfrm>
+            <a:off x="9953121" y="4551537"/>
+            <a:ext cx="914400" cy="914400"/>
+          </a:xfrm>
+          <a:prstGeom prst="rect">
+            <a:avLst/>
+          </a:prstGeom>
+        </p:spPr>
+        <p:style>
+          <a:lnRef idx="2">
+            <a:schemeClr val="accent1">
+              <a:shade val="50000"/>
+            </a:schemeClr>
+          </a:lnRef>
+          <a:fillRef idx="1">
+            <a:schemeClr val="accent1"/>
+          </a:fillRef>
+          <a:effectRef idx="0">
+            <a:schemeClr val="accent1"/>
+          </a:effectRef>
+          <a:fontRef idx="minor">
+            <a:schemeClr val="lt1"/>
+          </a:fontRef>
+        </p:style>
+        <p:txBody>
+          <a:bodyPr rtlCol="0" anchor="ctr"/>
+          <a:lstStyle/>
+          <a:p>
+            <a:pPr algn="ctr"/>
+            <a:r>
+              <a:rPr lang="en-US" dirty="0"/>
+              <a:t>LOSS </a:t>
+            </a:r>
+            <a:r>
+              <a:rPr lang="en-US" dirty="0" err="1"/>
+              <a:t>Fn</a:t>
+            </a:r>
+            <a:endParaRPr lang="en-US" dirty="0"/>
+          </a:p>
+          <a:p>
+            <a:pPr algn="ctr"/>
+            <a:r>
+              <a:rPr lang="en-US" dirty="0"/>
+              <a:t>Cross Entropy</a:t>
+            </a:r>
+          </a:p>
+        </p:txBody>
+      </p:sp>
+      <p:sp>
+        <p:nvSpPr>
+          <p:cNvPr id="33" name="TextBox 32">
+            <a:extLst>
+              <a:ext uri="{FF2B5EF4-FFF2-40B4-BE49-F238E27FC236}">
+                <a16:creationId xmlns:a16="http://schemas.microsoft.com/office/drawing/2014/main" id="{34DA38F8-E0AC-6E4E-A694-CAB5302A9D52}"/>
+              </a:ext>
+            </a:extLst>
+          </p:cNvPr>
+          <p:cNvSpPr txBox="1"/>
+          <p:nvPr/>
+        </p:nvSpPr>
+        <p:spPr>
+          <a:xfrm>
+            <a:off x="8271153" y="5523845"/>
+            <a:ext cx="1866408" cy="369332"/>
+          </a:xfrm>
+          <a:prstGeom prst="rect">
+            <a:avLst/>
+          </a:prstGeom>
+          <a:noFill/>
+        </p:spPr>
+        <p:txBody>
+          <a:bodyPr wrap="none" rtlCol="0">
+            <a:spAutoFit/>
+          </a:bodyPr>
+          <a:lstStyle/>
+          <a:p>
+            <a:r>
+              <a:rPr lang="en-US" dirty="0"/>
+              <a:t>Output </a:t>
+            </a:r>
+            <a:r>
+              <a:rPr lang="en-US" dirty="0">
+                <a:highlight>
+                  <a:srgbClr val="FF0000"/>
+                </a:highlight>
+              </a:rPr>
+              <a:t>Prediction</a:t>
+            </a:r>
+          </a:p>
+        </p:txBody>
+      </p:sp>
+      <p:sp>
+        <p:nvSpPr>
+          <p:cNvPr id="34" name="TextBox 33">
+            <a:extLst>
+              <a:ext uri="{FF2B5EF4-FFF2-40B4-BE49-F238E27FC236}">
+                <a16:creationId xmlns:a16="http://schemas.microsoft.com/office/drawing/2014/main" id="{9AD4A769-AA20-A346-90E5-372A1BF2A2A6}"/>
+              </a:ext>
+            </a:extLst>
+          </p:cNvPr>
+          <p:cNvSpPr txBox="1"/>
+          <p:nvPr/>
+        </p:nvSpPr>
+        <p:spPr>
+          <a:xfrm>
+            <a:off x="8455595" y="4090797"/>
+            <a:ext cx="1497526" cy="369332"/>
+          </a:xfrm>
+          <a:prstGeom prst="rect">
+            <a:avLst/>
+          </a:prstGeom>
+          <a:noFill/>
+        </p:spPr>
+        <p:txBody>
+          <a:bodyPr wrap="none" rtlCol="0">
+            <a:spAutoFit/>
+          </a:bodyPr>
+          <a:lstStyle/>
+          <a:p>
+            <a:r>
+              <a:rPr lang="en-US" dirty="0">
+                <a:highlight>
+                  <a:srgbClr val="FFFF00"/>
+                </a:highlight>
+              </a:rPr>
+              <a:t>Output Labels</a:t>
+            </a:r>
+          </a:p>
+        </p:txBody>
+      </p:sp>
+      <p:cxnSp>
+        <p:nvCxnSpPr>
+          <p:cNvPr id="36" name="Elbow Connector 35">
+            <a:extLst>
+              <a:ext uri="{FF2B5EF4-FFF2-40B4-BE49-F238E27FC236}">
+                <a16:creationId xmlns:a16="http://schemas.microsoft.com/office/drawing/2014/main" id="{73046321-FE05-A043-AEE3-073CC2F95BE3}"/>
+              </a:ext>
+            </a:extLst>
+          </p:cNvPr>
+          <p:cNvCxnSpPr>
+            <a:cxnSpLocks/>
+            <a:stCxn id="34" idx="2"/>
+            <a:endCxn id="30" idx="1"/>
+          </p:cNvCxnSpPr>
+          <p:nvPr/>
+        </p:nvCxnSpPr>
+        <p:spPr>
+          <a:xfrm rot="16200000" flipH="1">
+            <a:off x="9304435" y="4360051"/>
+            <a:ext cx="548608" cy="748763"/>
+          </a:xfrm>
+          <a:prstGeom prst="bentConnector2">
+            <a:avLst/>
+          </a:prstGeom>
+          <a:ln>
+            <a:tailEnd type="triangle"/>
+          </a:ln>
+        </p:spPr>
+        <p:style>
+          <a:lnRef idx="1">
+            <a:schemeClr val="accent1"/>
+          </a:lnRef>
+          <a:fillRef idx="0">
+            <a:schemeClr val="accent1"/>
+          </a:fillRef>
+          <a:effectRef idx="0">
+            <a:schemeClr val="accent1"/>
+          </a:effectRef>
+          <a:fontRef idx="minor">
+            <a:schemeClr val="tx1"/>
+          </a:fontRef>
+        </p:style>
+      </p:cxnSp>
+      <p:cxnSp>
+        <p:nvCxnSpPr>
+          <p:cNvPr id="39" name="Elbow Connector 38">
+            <a:extLst>
+              <a:ext uri="{FF2B5EF4-FFF2-40B4-BE49-F238E27FC236}">
+                <a16:creationId xmlns:a16="http://schemas.microsoft.com/office/drawing/2014/main" id="{1B436DE9-376C-A74F-B349-E719751E75B2}"/>
+              </a:ext>
+            </a:extLst>
+          </p:cNvPr>
+          <p:cNvCxnSpPr>
+            <a:cxnSpLocks/>
+            <a:stCxn id="33" idx="0"/>
+            <a:endCxn id="30" idx="1"/>
+          </p:cNvCxnSpPr>
+          <p:nvPr/>
+        </p:nvCxnSpPr>
+        <p:spPr>
+          <a:xfrm rot="5400000" flipH="1" flipV="1">
+            <a:off x="9321185" y="4891909"/>
+            <a:ext cx="515108" cy="748764"/>
+          </a:xfrm>
+          <a:prstGeom prst="bentConnector2">
+            <a:avLst/>
+          </a:prstGeom>
+          <a:ln>
+            <a:tailEnd type="triangle"/>
+          </a:ln>
+        </p:spPr>
+        <p:style>
+          <a:lnRef idx="1">
+            <a:schemeClr val="accent1"/>
+          </a:lnRef>
+          <a:fillRef idx="0">
+            <a:schemeClr val="accent1"/>
+          </a:fillRef>
+          <a:effectRef idx="0">
+            <a:schemeClr val="accent1"/>
+          </a:effectRef>
+          <a:fontRef idx="minor">
+            <a:schemeClr val="tx1"/>
+          </a:fontRef>
+        </p:style>
+      </p:cxnSp>
+      <p:sp>
+        <p:nvSpPr>
+          <p:cNvPr id="43" name="TextBox 42">
+            <a:extLst>
+              <a:ext uri="{FF2B5EF4-FFF2-40B4-BE49-F238E27FC236}">
+                <a16:creationId xmlns:a16="http://schemas.microsoft.com/office/drawing/2014/main" id="{328B1238-A97D-914E-89E6-4BDFA1D6F4F9}"/>
+              </a:ext>
+            </a:extLst>
+          </p:cNvPr>
+          <p:cNvSpPr txBox="1"/>
+          <p:nvPr/>
+        </p:nvSpPr>
+        <p:spPr>
+          <a:xfrm>
+            <a:off x="10943679" y="4823419"/>
+            <a:ext cx="1048300" cy="369332"/>
+          </a:xfrm>
+          <a:prstGeom prst="rect">
+            <a:avLst/>
+          </a:prstGeom>
+          <a:noFill/>
+        </p:spPr>
+        <p:txBody>
+          <a:bodyPr wrap="none" rtlCol="0">
+            <a:spAutoFit/>
+          </a:bodyPr>
+          <a:lstStyle/>
+          <a:p>
+            <a:r>
+              <a:rPr lang="en-US" dirty="0"/>
+              <a:t>Minimize</a:t>
+            </a:r>
+          </a:p>
+        </p:txBody>
+      </p:sp>
+      <p:sp>
+        <p:nvSpPr>
+          <p:cNvPr id="44" name="TextBox 43">
+            <a:extLst>
+              <a:ext uri="{FF2B5EF4-FFF2-40B4-BE49-F238E27FC236}">
+                <a16:creationId xmlns:a16="http://schemas.microsoft.com/office/drawing/2014/main" id="{29D59B1A-683D-F848-BC5C-EE214ABE6CEA}"/>
+              </a:ext>
+            </a:extLst>
+          </p:cNvPr>
+          <p:cNvSpPr txBox="1"/>
+          <p:nvPr/>
+        </p:nvSpPr>
+        <p:spPr>
+          <a:xfrm>
+            <a:off x="7459898" y="2946546"/>
+            <a:ext cx="2950423" cy="369332"/>
+          </a:xfrm>
+          <a:prstGeom prst="rect">
+            <a:avLst/>
+          </a:prstGeom>
+          <a:noFill/>
+        </p:spPr>
+        <p:txBody>
+          <a:bodyPr wrap="none" rtlCol="0">
+            <a:spAutoFit/>
+          </a:bodyPr>
+          <a:lstStyle/>
+          <a:p>
+            <a:r>
+              <a:rPr lang="en-US" dirty="0"/>
+              <a:t>Tune all trainable parameters</a:t>
+            </a:r>
+          </a:p>
+        </p:txBody>
+      </p:sp>
+      <p:cxnSp>
+        <p:nvCxnSpPr>
+          <p:cNvPr id="46" name="Curved Connector 45">
+            <a:extLst>
+              <a:ext uri="{FF2B5EF4-FFF2-40B4-BE49-F238E27FC236}">
+                <a16:creationId xmlns:a16="http://schemas.microsoft.com/office/drawing/2014/main" id="{ECC6284A-6155-F44C-9EC2-90EC6EF9CD5D}"/>
+              </a:ext>
+            </a:extLst>
+          </p:cNvPr>
+          <p:cNvCxnSpPr>
+            <a:stCxn id="43" idx="0"/>
+            <a:endCxn id="44" idx="3"/>
+          </p:cNvCxnSpPr>
+          <p:nvPr/>
+        </p:nvCxnSpPr>
+        <p:spPr>
+          <a:xfrm rot="16200000" flipV="1">
+            <a:off x="10092972" y="3448562"/>
+            <a:ext cx="1692207" cy="1057508"/>
+          </a:xfrm>
+          <a:prstGeom prst="curvedConnector2">
+            <a:avLst/>
+          </a:prstGeom>
+          <a:ln>
+            <a:tailEnd type="triangle"/>
+          </a:ln>
+        </p:spPr>
+        <p:style>
+          <a:lnRef idx="1">
+            <a:schemeClr val="accent1"/>
+          </a:lnRef>
+          <a:fillRef idx="0">
+            <a:schemeClr val="accent1"/>
+          </a:fillRef>
+          <a:effectRef idx="0">
+            <a:schemeClr val="accent1"/>
+          </a:effectRef>
+          <a:fontRef idx="minor">
+            <a:schemeClr val="tx1"/>
+          </a:fontRef>
+        </p:style>
+      </p:cxnSp>
+      <p:cxnSp>
+        <p:nvCxnSpPr>
+          <p:cNvPr id="47" name="Curved Connector 46">
+            <a:extLst>
+              <a:ext uri="{FF2B5EF4-FFF2-40B4-BE49-F238E27FC236}">
+                <a16:creationId xmlns:a16="http://schemas.microsoft.com/office/drawing/2014/main" id="{EBA1CE41-6B9E-B54B-A84C-49F5FC7FD9F6}"/>
+              </a:ext>
+            </a:extLst>
+          </p:cNvPr>
+          <p:cNvCxnSpPr>
+            <a:cxnSpLocks/>
+            <a:stCxn id="44" idx="1"/>
+            <a:endCxn id="24" idx="0"/>
+          </p:cNvCxnSpPr>
+          <p:nvPr/>
+        </p:nvCxnSpPr>
+        <p:spPr>
+          <a:xfrm rot="10800000" flipV="1">
+            <a:off x="5668380" y="3131212"/>
+            <a:ext cx="1791518" cy="320608"/>
+          </a:xfrm>
+          <a:prstGeom prst="curvedConnector2">
+            <a:avLst/>
+          </a:prstGeom>
+          <a:ln>
+            <a:tailEnd type="triangle"/>
+          </a:ln>
+        </p:spPr>
+        <p:style>
+          <a:lnRef idx="1">
+            <a:schemeClr val="accent1"/>
+          </a:lnRef>
+          <a:fillRef idx="0">
+            <a:schemeClr val="accent1"/>
+          </a:fillRef>
+          <a:effectRef idx="0">
+            <a:schemeClr val="accent1"/>
+          </a:effectRef>
+          <a:fontRef idx="minor">
+            <a:schemeClr val="tx1"/>
+          </a:fontRef>
+        </p:style>
+      </p:cxnSp>
+      <p:sp>
+        <p:nvSpPr>
+          <p:cNvPr id="50" name="TextBox 49">
+            <a:extLst>
+              <a:ext uri="{FF2B5EF4-FFF2-40B4-BE49-F238E27FC236}">
+                <a16:creationId xmlns:a16="http://schemas.microsoft.com/office/drawing/2014/main" id="{D9846056-8484-F24E-94E6-23A0DDACF6CE}"/>
+              </a:ext>
+            </a:extLst>
+          </p:cNvPr>
+          <p:cNvSpPr txBox="1"/>
+          <p:nvPr/>
+        </p:nvSpPr>
+        <p:spPr>
+          <a:xfrm>
+            <a:off x="11100930" y="5199573"/>
+            <a:ext cx="711092" cy="369332"/>
+          </a:xfrm>
+          <a:prstGeom prst="rect">
+            <a:avLst/>
+          </a:prstGeom>
+          <a:noFill/>
+        </p:spPr>
+        <p:txBody>
+          <a:bodyPr wrap="none" rtlCol="0">
+            <a:spAutoFit/>
+          </a:bodyPr>
+          <a:lstStyle/>
+          <a:p>
+            <a:r>
+              <a:rPr lang="en-US" dirty="0"/>
+              <a:t>GOAL</a:t>
+            </a:r>
+          </a:p>
+        </p:txBody>
+      </p:sp>
+      <p:sp>
+        <p:nvSpPr>
+          <p:cNvPr id="51" name="Rectangle 50">
+            <a:extLst>
+              <a:ext uri="{FF2B5EF4-FFF2-40B4-BE49-F238E27FC236}">
+                <a16:creationId xmlns:a16="http://schemas.microsoft.com/office/drawing/2014/main" id="{FE97763C-E2CB-364D-A892-2EB0178D02E3}"/>
+              </a:ext>
+            </a:extLst>
+          </p:cNvPr>
+          <p:cNvSpPr/>
+          <p:nvPr/>
+        </p:nvSpPr>
+        <p:spPr>
+          <a:xfrm>
+            <a:off x="4585948" y="3810940"/>
+            <a:ext cx="1470339" cy="369332"/>
+          </a:xfrm>
+          <a:prstGeom prst="rect">
+            <a:avLst/>
+          </a:prstGeom>
+        </p:spPr>
+        <p:txBody>
+          <a:bodyPr wrap="none">
+            <a:spAutoFit/>
+          </a:bodyPr>
+          <a:lstStyle/>
+          <a:p>
+            <a:r>
+              <a:rPr lang="en-US" dirty="0"/>
+              <a:t>or “trainable”</a:t>
+            </a:r>
+          </a:p>
+        </p:txBody>
+      </p:sp>
+      <p:sp>
+        <p:nvSpPr>
+          <p:cNvPr id="52" name="TextBox 51">
+            <a:extLst>
+              <a:ext uri="{FF2B5EF4-FFF2-40B4-BE49-F238E27FC236}">
+                <a16:creationId xmlns:a16="http://schemas.microsoft.com/office/drawing/2014/main" id="{E1025C1F-609B-034F-BE32-AB3E5C179B04}"/>
+              </a:ext>
+            </a:extLst>
+          </p:cNvPr>
+          <p:cNvSpPr txBox="1"/>
+          <p:nvPr/>
+        </p:nvSpPr>
+        <p:spPr>
+          <a:xfrm>
+            <a:off x="7736483" y="5912905"/>
+            <a:ext cx="4075539" cy="923330"/>
+          </a:xfrm>
+          <a:prstGeom prst="rect">
+            <a:avLst/>
+          </a:prstGeom>
+          <a:noFill/>
+        </p:spPr>
+        <p:txBody>
+          <a:bodyPr wrap="none" rtlCol="0">
+            <a:spAutoFit/>
+          </a:bodyPr>
+          <a:lstStyle/>
+          <a:p>
+            <a:r>
+              <a:rPr lang="en-US" dirty="0"/>
+              <a:t>0 – 90% -&gt; loss is high -&gt; tune parameters</a:t>
+            </a:r>
+          </a:p>
+          <a:p>
+            <a:r>
+              <a:rPr lang="en-US" dirty="0"/>
+              <a:t>1 – 50% -&gt; tune parameters again</a:t>
+            </a:r>
+          </a:p>
+          <a:p>
+            <a:r>
+              <a:rPr lang="en-US" dirty="0"/>
+              <a:t>1 – 90% -&gt; ok, stop.</a:t>
+            </a:r>
+          </a:p>
+        </p:txBody>
+      </p:sp>
+      <p:sp>
+        <p:nvSpPr>
+          <p:cNvPr id="53" name="TextBox 52">
+            <a:extLst>
+              <a:ext uri="{FF2B5EF4-FFF2-40B4-BE49-F238E27FC236}">
+                <a16:creationId xmlns:a16="http://schemas.microsoft.com/office/drawing/2014/main" id="{91FE0A9A-2BA6-E246-9304-5DACFD8FB6F9}"/>
+              </a:ext>
+            </a:extLst>
+          </p:cNvPr>
+          <p:cNvSpPr txBox="1"/>
+          <p:nvPr/>
+        </p:nvSpPr>
+        <p:spPr>
+          <a:xfrm>
+            <a:off x="9090624" y="3675955"/>
+            <a:ext cx="301686" cy="369332"/>
+          </a:xfrm>
+          <a:prstGeom prst="rect">
+            <a:avLst/>
+          </a:prstGeom>
+          <a:noFill/>
+        </p:spPr>
+        <p:txBody>
+          <a:bodyPr wrap="none" rtlCol="0">
+            <a:spAutoFit/>
+          </a:bodyPr>
+          <a:lstStyle/>
+          <a:p>
+            <a:r>
+              <a:rPr lang="en-US" dirty="0"/>
+              <a:t>1</a:t>
+            </a:r>
+          </a:p>
+        </p:txBody>
+      </p:sp>
+      <p:sp>
+        <p:nvSpPr>
+          <p:cNvPr id="55" name="TextBox 54">
+            <a:extLst>
+              <a:ext uri="{FF2B5EF4-FFF2-40B4-BE49-F238E27FC236}">
+                <a16:creationId xmlns:a16="http://schemas.microsoft.com/office/drawing/2014/main" id="{DCAE19A7-58DD-214F-AFCE-27E23B737838}"/>
+              </a:ext>
+            </a:extLst>
+          </p:cNvPr>
+          <p:cNvSpPr txBox="1"/>
+          <p:nvPr/>
+        </p:nvSpPr>
+        <p:spPr>
+          <a:xfrm>
+            <a:off x="5008816" y="-15131"/>
+            <a:ext cx="7123002" cy="2893100"/>
+          </a:xfrm>
+          <a:prstGeom prst="rect">
+            <a:avLst/>
+          </a:prstGeom>
+          <a:noFill/>
+        </p:spPr>
+        <p:txBody>
+          <a:bodyPr wrap="square" rtlCol="0">
+            <a:spAutoFit/>
+          </a:bodyPr>
+          <a:lstStyle/>
+          <a:p>
+            <a:r>
+              <a:rPr lang="en-US" sz="1400" b="1" dirty="0"/>
+              <a:t>Deep Learning Training Process</a:t>
+            </a:r>
+          </a:p>
+          <a:p>
+            <a:endParaRPr lang="en-US" sz="1400" dirty="0"/>
+          </a:p>
+          <a:p>
+            <a:pPr marL="285750" indent="-285750">
+              <a:buFontTx/>
+              <a:buChar char="-"/>
+            </a:pPr>
+            <a:r>
+              <a:rPr lang="en-US" sz="1400" dirty="0"/>
+              <a:t>Weights are randomly initialized in the beginning</a:t>
+            </a:r>
+          </a:p>
+          <a:p>
+            <a:pPr marL="285750" indent="-285750">
+              <a:buFontTx/>
+              <a:buChar char="-"/>
+            </a:pPr>
+            <a:r>
+              <a:rPr lang="en-US" sz="1400" dirty="0"/>
+              <a:t>We know the actual labels</a:t>
+            </a:r>
+          </a:p>
+          <a:p>
+            <a:pPr marL="285750" indent="-285750">
+              <a:buFontTx/>
+              <a:buChar char="-"/>
+            </a:pPr>
+            <a:endParaRPr lang="en-US" sz="1400" dirty="0"/>
+          </a:p>
+          <a:p>
+            <a:pPr marL="342900" indent="-342900">
+              <a:buAutoNum type="arabicPeriod"/>
+            </a:pPr>
+            <a:r>
+              <a:rPr lang="en-US" sz="1400" dirty="0"/>
+              <a:t>Input data -&gt; Batch of data = 64 data samples</a:t>
+            </a:r>
+          </a:p>
+          <a:p>
+            <a:pPr marL="342900" indent="-342900">
+              <a:buAutoNum type="arabicPeriod"/>
+            </a:pPr>
+            <a:r>
+              <a:rPr lang="en-US" sz="1400" dirty="0"/>
+              <a:t>We find the predictions.</a:t>
+            </a:r>
+          </a:p>
+          <a:p>
+            <a:pPr marL="342900" indent="-342900">
+              <a:buAutoNum type="arabicPeriod"/>
+            </a:pPr>
+            <a:r>
+              <a:rPr lang="en-US" sz="1400" dirty="0"/>
+              <a:t>We pass the predictions to optimizer (optimizer already knows what the actual labels are.)</a:t>
+            </a:r>
+          </a:p>
+          <a:p>
+            <a:pPr marL="342900" indent="-342900">
+              <a:buAutoNum type="arabicPeriod"/>
+            </a:pPr>
+            <a:r>
+              <a:rPr lang="en-US" sz="1400" dirty="0"/>
+              <a:t>We find the loss between predicted labels and actual labels.</a:t>
+            </a:r>
+          </a:p>
+          <a:p>
+            <a:pPr marL="342900" indent="-342900">
+              <a:buAutoNum type="arabicPeriod"/>
+            </a:pPr>
+            <a:r>
+              <a:rPr lang="en-US" sz="1400" dirty="0"/>
+              <a:t>We tune the “learnable” parameters according to the loss.</a:t>
+            </a:r>
+          </a:p>
+          <a:p>
+            <a:pPr marL="342900" indent="-342900">
+              <a:buAutoNum type="arabicPeriod"/>
+            </a:pPr>
+            <a:r>
+              <a:rPr lang="en-US" sz="1400" dirty="0"/>
+              <a:t>Go back to step 1.</a:t>
+            </a:r>
+          </a:p>
+          <a:p>
+            <a:pPr marL="342900" indent="-342900">
+              <a:buAutoNum type="arabicPeriod"/>
+            </a:pPr>
+            <a:endParaRPr lang="en-US" sz="1400" dirty="0"/>
+          </a:p>
+          <a:p>
+            <a:pPr marL="342900" indent="-342900">
+              <a:buAutoNum type="arabicPeriod"/>
+            </a:pPr>
+            <a:endParaRPr lang="en-US" sz="1400" dirty="0"/>
+          </a:p>
+        </p:txBody>
+      </p:sp>
+      <p:cxnSp>
+        <p:nvCxnSpPr>
+          <p:cNvPr id="59" name="Curved Connector 58">
+            <a:extLst>
+              <a:ext uri="{FF2B5EF4-FFF2-40B4-BE49-F238E27FC236}">
+                <a16:creationId xmlns:a16="http://schemas.microsoft.com/office/drawing/2014/main" id="{4C2716A7-3DF9-5C4A-BD8D-0F43F2F40979}"/>
+              </a:ext>
+            </a:extLst>
+          </p:cNvPr>
+          <p:cNvCxnSpPr/>
+          <p:nvPr/>
+        </p:nvCxnSpPr>
+        <p:spPr>
+          <a:xfrm rot="5400000" flipH="1" flipV="1">
+            <a:off x="4481726" y="1761822"/>
+            <a:ext cx="1054181" cy="12700"/>
+          </a:xfrm>
+          <a:prstGeom prst="curvedConnector3">
+            <a:avLst>
+              <a:gd name="adj1" fmla="val 47237"/>
+            </a:avLst>
+          </a:prstGeom>
+          <a:ln>
+            <a:tailEnd type="triangle"/>
+          </a:ln>
+        </p:spPr>
+        <p:style>
+          <a:lnRef idx="1">
+            <a:schemeClr val="accent1"/>
+          </a:lnRef>
+          <a:fillRef idx="0">
+            <a:schemeClr val="accent1"/>
+          </a:fillRef>
+          <a:effectRef idx="0">
+            <a:schemeClr val="accent1"/>
+          </a:effectRef>
+          <a:fontRef idx="minor">
+            <a:schemeClr val="tx1"/>
+          </a:fontRef>
+        </p:style>
+      </p:cxnSp>
+    </p:spTree>
+    <p:extLst>
+      <p:ext uri="{BB962C8B-B14F-4D97-AF65-F5344CB8AC3E}">
+        <p14:creationId xmlns:p14="http://schemas.microsoft.com/office/powerpoint/2010/main" val="3295524656"/>
+      </p:ext>
+    </p:extLst>
+  </p:cSld>
+  <p:clrMapOvr>
+    <a:masterClrMapping/>
+  </p:clrMapOvr>
+</p:sld>
+</file>
+
+<file path=ppt/slides/slide12.xml><?xml version="1.0" encoding="utf-8"?>
+<p:sld xmlns:a="http://schemas.openxmlformats.org/drawingml/2006/main" xmlns:r="http://schemas.openxmlformats.org/officeDocument/2006/relationships" xmlns:p="http://schemas.openxmlformats.org/presentationml/2006/main">
+  <p:cSld>
+    <p:spTree>
+      <p:nvGrpSpPr>
+        <p:cNvPr id="1" name=""/>
+        <p:cNvGrpSpPr/>
+        <p:nvPr/>
+      </p:nvGrpSpPr>
+      <p:grpSpPr>
+        <a:xfrm>
+          <a:off x="0" y="0"/>
+          <a:ext cx="0" cy="0"/>
+          <a:chOff x="0" y="0"/>
+          <a:chExt cx="0" cy="0"/>
+        </a:xfrm>
+      </p:grpSpPr>
+      <p:sp>
+        <p:nvSpPr>
           <p:cNvPr id="2" name="Title 1">
             <a:extLst>
               <a:ext uri="{FF2B5EF4-FFF2-40B4-BE49-F238E27FC236}">
-                <a16:creationId xmlns:a16="http://schemas.microsoft.com/office/drawing/2014/main" id="{A68BA7D0-035C-4046-8A0E-5ABD5E26DCAC}"/>
+                <a16:creationId xmlns:a16="http://schemas.microsoft.com/office/drawing/2014/main" id="{75682126-7819-4345-810B-C3E986181943}"/>
               </a:ext>
             </a:extLst>
           </p:cNvPr>
@@ -4109,7 +5978,7 @@
           <a:p>
             <a:r>
               <a:rPr lang="en-US" dirty="0"/>
-              <a:t>Step 5: Evaluate the Trained Model</a:t>
+              <a:t>Step 4: Train the NLP Model</a:t>
             </a:r>
           </a:p>
         </p:txBody>
@@ -4119,7 +5988,7 @@
           <p:cNvPr id="4" name="Slide Number Placeholder 3">
             <a:extLst>
               <a:ext uri="{FF2B5EF4-FFF2-40B4-BE49-F238E27FC236}">
-                <a16:creationId xmlns:a16="http://schemas.microsoft.com/office/drawing/2014/main" id="{B4952441-DF87-954E-8B3B-0F4AE0B79C6A}"/>
+                <a16:creationId xmlns:a16="http://schemas.microsoft.com/office/drawing/2014/main" id="{CE4740FF-2A97-E741-9DD7-8A0B10835784}"/>
               </a:ext>
             </a:extLst>
           </p:cNvPr>
@@ -4137,7 +6006,195 @@
           <a:p>
             <a:fld id="{330EA680-D336-4FF7-8B7A-9848BB0A1C32}" type="slidenum">
               <a:rPr lang="en-US" smtClean="0"/>
-              <a:t>10</a:t>
+              <a:t>12</a:t>
+            </a:fld>
+            <a:endParaRPr lang="en-US"/>
+          </a:p>
+        </p:txBody>
+      </p:sp>
+      <p:sp>
+        <p:nvSpPr>
+          <p:cNvPr id="5" name="Content Placeholder 2">
+            <a:extLst>
+              <a:ext uri="{FF2B5EF4-FFF2-40B4-BE49-F238E27FC236}">
+                <a16:creationId xmlns:a16="http://schemas.microsoft.com/office/drawing/2014/main" id="{9F648C27-C7E0-1F4B-8BEB-82784C3C0D0B}"/>
+              </a:ext>
+            </a:extLst>
+          </p:cNvPr>
+          <p:cNvSpPr>
+            <a:spLocks noGrp="1"/>
+          </p:cNvSpPr>
+          <p:nvPr>
+            <p:ph idx="1"/>
+          </p:nvPr>
+        </p:nvSpPr>
+        <p:spPr>
+          <a:xfrm>
+            <a:off x="838200" y="2900361"/>
+            <a:ext cx="10515600" cy="3276601"/>
+          </a:xfrm>
+        </p:spPr>
+        <p:txBody>
+          <a:bodyPr>
+            <a:normAutofit/>
+          </a:bodyPr>
+          <a:lstStyle/>
+          <a:p>
+            <a:pPr marL="0" indent="0">
+              <a:buNone/>
+            </a:pPr>
+            <a:r>
+              <a:rPr lang="en-US" sz="1600" dirty="0">
+                <a:latin typeface="Arial" panose="020B0604020202020204" pitchFamily="34" charset="0"/>
+                <a:cs typeface="Arial" panose="020B0604020202020204" pitchFamily="34" charset="0"/>
+              </a:rPr>
+              <a:t>Once we have defined the model, now we can compile the model with the loss and optimizer functions just like we did for the DNN and CNN examples last week. We can then fit the model on the train dataset to train the embedding layer, RNN, and dense layers. Note that the RNN layer has multiple layers inside which enables the temporal or sequential nature of learning. The overall parameters of the model is thus dependent on the embedding size, number and size of RNN layers, and the number and size of dense layers.</a:t>
+            </a:r>
+          </a:p>
+        </p:txBody>
+      </p:sp>
+      <p:pic>
+        <p:nvPicPr>
+          <p:cNvPr id="6" name="Picture 5">
+            <a:extLst>
+              <a:ext uri="{FF2B5EF4-FFF2-40B4-BE49-F238E27FC236}">
+                <a16:creationId xmlns:a16="http://schemas.microsoft.com/office/drawing/2014/main" id="{A5DBB38F-CBEA-8C48-8721-8E9D454C3A33}"/>
+              </a:ext>
+            </a:extLst>
+          </p:cNvPr>
+          <p:cNvPicPr>
+            <a:picLocks noChangeAspect="1"/>
+          </p:cNvPicPr>
+          <p:nvPr/>
+        </p:nvPicPr>
+        <p:blipFill>
+          <a:blip r:embed="rId2"/>
+          <a:stretch>
+            <a:fillRect/>
+          </a:stretch>
+        </p:blipFill>
+        <p:spPr>
+          <a:xfrm>
+            <a:off x="989629" y="1781173"/>
+            <a:ext cx="8039100" cy="939800"/>
+          </a:xfrm>
+          <a:prstGeom prst="rect">
+            <a:avLst/>
+          </a:prstGeom>
+        </p:spPr>
+      </p:pic>
+      <p:pic>
+        <p:nvPicPr>
+          <p:cNvPr id="7" name="Picture 6">
+            <a:extLst>
+              <a:ext uri="{FF2B5EF4-FFF2-40B4-BE49-F238E27FC236}">
+                <a16:creationId xmlns:a16="http://schemas.microsoft.com/office/drawing/2014/main" id="{2879467E-E8E7-2C48-AC7B-0324F3F15581}"/>
+              </a:ext>
+            </a:extLst>
+          </p:cNvPr>
+          <p:cNvPicPr>
+            <a:picLocks noChangeAspect="1"/>
+          </p:cNvPicPr>
+          <p:nvPr/>
+        </p:nvPicPr>
+        <p:blipFill>
+          <a:blip r:embed="rId3"/>
+          <a:stretch>
+            <a:fillRect/>
+          </a:stretch>
+        </p:blipFill>
+        <p:spPr>
+          <a:xfrm>
+            <a:off x="838200" y="4538661"/>
+            <a:ext cx="6377432" cy="599222"/>
+          </a:xfrm>
+          <a:prstGeom prst="rect">
+            <a:avLst/>
+          </a:prstGeom>
+        </p:spPr>
+      </p:pic>
+    </p:spTree>
+    <p:extLst>
+      <p:ext uri="{BB962C8B-B14F-4D97-AF65-F5344CB8AC3E}">
+        <p14:creationId xmlns:p14="http://schemas.microsoft.com/office/powerpoint/2010/main" val="295500195"/>
+      </p:ext>
+    </p:extLst>
+  </p:cSld>
+  <p:clrMapOvr>
+    <a:masterClrMapping/>
+  </p:clrMapOvr>
+</p:sld>
+</file>
+
+<file path=ppt/slides/slide13.xml><?xml version="1.0" encoding="utf-8"?>
+<p:sld xmlns:a="http://schemas.openxmlformats.org/drawingml/2006/main" xmlns:r="http://schemas.openxmlformats.org/officeDocument/2006/relationships" xmlns:p="http://schemas.openxmlformats.org/presentationml/2006/main">
+  <p:cSld>
+    <p:spTree>
+      <p:nvGrpSpPr>
+        <p:cNvPr id="1" name=""/>
+        <p:cNvGrpSpPr/>
+        <p:nvPr/>
+      </p:nvGrpSpPr>
+      <p:grpSpPr>
+        <a:xfrm>
+          <a:off x="0" y="0"/>
+          <a:ext cx="0" cy="0"/>
+          <a:chOff x="0" y="0"/>
+          <a:chExt cx="0" cy="0"/>
+        </a:xfrm>
+      </p:grpSpPr>
+      <p:sp>
+        <p:nvSpPr>
+          <p:cNvPr id="2" name="Title 1">
+            <a:extLst>
+              <a:ext uri="{FF2B5EF4-FFF2-40B4-BE49-F238E27FC236}">
+                <a16:creationId xmlns:a16="http://schemas.microsoft.com/office/drawing/2014/main" id="{A68BA7D0-035C-4046-8A0E-5ABD5E26DCAC}"/>
+              </a:ext>
+            </a:extLst>
+          </p:cNvPr>
+          <p:cNvSpPr>
+            <a:spLocks noGrp="1"/>
+          </p:cNvSpPr>
+          <p:nvPr>
+            <p:ph type="title"/>
+          </p:nvPr>
+        </p:nvSpPr>
+        <p:spPr/>
+        <p:txBody>
+          <a:bodyPr/>
+          <a:lstStyle/>
+          <a:p>
+            <a:r>
+              <a:rPr lang="en-US" dirty="0"/>
+              <a:t>Step 5: Evaluate the Trained Model</a:t>
+            </a:r>
+          </a:p>
+        </p:txBody>
+      </p:sp>
+      <p:sp>
+        <p:nvSpPr>
+          <p:cNvPr id="4" name="Slide Number Placeholder 3">
+            <a:extLst>
+              <a:ext uri="{FF2B5EF4-FFF2-40B4-BE49-F238E27FC236}">
+                <a16:creationId xmlns:a16="http://schemas.microsoft.com/office/drawing/2014/main" id="{B4952441-DF87-954E-8B3B-0F4AE0B79C6A}"/>
+              </a:ext>
+            </a:extLst>
+          </p:cNvPr>
+          <p:cNvSpPr>
+            <a:spLocks noGrp="1"/>
+          </p:cNvSpPr>
+          <p:nvPr>
+            <p:ph type="sldNum" sz="quarter" idx="12"/>
+          </p:nvPr>
+        </p:nvSpPr>
+        <p:spPr/>
+        <p:txBody>
+          <a:bodyPr/>
+          <a:lstStyle/>
+          <a:p>
+            <a:fld id="{330EA680-D336-4FF7-8B7A-9848BB0A1C32}" type="slidenum">
+              <a:rPr lang="en-US" smtClean="0"/>
+              <a:t>13</a:t>
             </a:fld>
             <a:endParaRPr lang="en-US"/>
           </a:p>
@@ -4320,7 +6377,7 @@
 </p:sld>
 </file>
 
-<file path=ppt/slides/slide11.xml><?xml version="1.0" encoding="utf-8"?>
+<file path=ppt/slides/slide14.xml><?xml version="1.0" encoding="utf-8"?>
 <p:sld xmlns:a="http://schemas.openxmlformats.org/drawingml/2006/main" xmlns:r="http://schemas.openxmlformats.org/officeDocument/2006/relationships" xmlns:p="http://schemas.openxmlformats.org/presentationml/2006/main">
   <p:cSld>
     <p:bg>
@@ -4640,7 +6697,7 @@
                   <a:spcPts val="600"/>
                 </a:spcAft>
               </a:pPr>
-              <a:t>11</a:t>
+              <a:t>14</a:t>
             </a:fld>
             <a:endParaRPr lang="en-US" sz="900">
               <a:solidFill>
@@ -4663,7 +6720,7 @@
 </p:sld>
 </file>
 
-<file path=ppt/slides/slide12.xml><?xml version="1.0" encoding="utf-8"?>
+<file path=ppt/slides/slide15.xml><?xml version="1.0" encoding="utf-8"?>
 <p:sld xmlns:a="http://schemas.openxmlformats.org/drawingml/2006/main" xmlns:r="http://schemas.openxmlformats.org/officeDocument/2006/relationships" xmlns:p="http://schemas.openxmlformats.org/presentationml/2006/main">
   <p:cSld>
     <p:spTree>
@@ -4794,7 +6851,7 @@
             <a:fld id="{00000000-1234-1234-1234-123412341234}" type="slidenum">
               <a:rPr lang="en"/>
               <a:pPr/>
-              <a:t>12</a:t>
+              <a:t>15</a:t>
             </a:fld>
             <a:endParaRPr/>
           </a:p>
@@ -4955,7 +7012,7 @@
 </p:sld>
 </file>
 
-<file path=ppt/slides/slide13.xml><?xml version="1.0" encoding="utf-8"?>
+<file path=ppt/slides/slide16.xml><?xml version="1.0" encoding="utf-8"?>
 <p:sld xmlns:a="http://schemas.openxmlformats.org/drawingml/2006/main" xmlns:r="http://schemas.openxmlformats.org/officeDocument/2006/relationships" xmlns:p="http://schemas.openxmlformats.org/presentationml/2006/main">
   <p:cSld>
     <p:spTree>
@@ -5055,7 +7112,7 @@
             <a:fld id="{00000000-1234-1234-1234-123412341234}" type="slidenum">
               <a:rPr lang="en"/>
               <a:pPr/>
-              <a:t>13</a:t>
+              <a:t>16</a:t>
             </a:fld>
             <a:endParaRPr/>
           </a:p>
@@ -5214,7 +7271,7 @@
 </p:sld>
 </file>
 
-<file path=ppt/slides/slide14.xml><?xml version="1.0" encoding="utf-8"?>
+<file path=ppt/slides/slide17.xml><?xml version="1.0" encoding="utf-8"?>
 <p:sld xmlns:a="http://schemas.openxmlformats.org/drawingml/2006/main" xmlns:r="http://schemas.openxmlformats.org/officeDocument/2006/relationships" xmlns:p="http://schemas.openxmlformats.org/presentationml/2006/main">
   <p:cSld>
     <p:spTree>
@@ -5422,7 +7479,7 @@
             <a:fld id="{00000000-1234-1234-1234-123412341234}" type="slidenum">
               <a:rPr lang="en"/>
               <a:pPr/>
-              <a:t>14</a:t>
+              <a:t>17</a:t>
             </a:fld>
             <a:endParaRPr/>
           </a:p>
@@ -5466,7 +7523,7 @@
 </p:sld>
 </file>
 
-<file path=ppt/slides/slide15.xml><?xml version="1.0" encoding="utf-8"?>
+<file path=ppt/slides/slide18.xml><?xml version="1.0" encoding="utf-8"?>
 <p:sld xmlns:a="http://schemas.openxmlformats.org/drawingml/2006/main" xmlns:r="http://schemas.openxmlformats.org/officeDocument/2006/relationships" xmlns:p="http://schemas.openxmlformats.org/presentationml/2006/main">
   <p:cSld>
     <p:spTree>
@@ -5676,7 +7733,7 @@
             <a:fld id="{00000000-1234-1234-1234-123412341234}" type="slidenum">
               <a:rPr lang="en"/>
               <a:pPr/>
-              <a:t>15</a:t>
+              <a:t>18</a:t>
             </a:fld>
             <a:endParaRPr/>
           </a:p>
@@ -5717,7 +7774,7 @@
 </p:sld>
 </file>
 
-<file path=ppt/slides/slide16.xml><?xml version="1.0" encoding="utf-8"?>
+<file path=ppt/slides/slide19.xml><?xml version="1.0" encoding="utf-8"?>
 <p:sld xmlns:a="http://schemas.openxmlformats.org/drawingml/2006/main" xmlns:r="http://schemas.openxmlformats.org/officeDocument/2006/relationships" xmlns:p="http://schemas.openxmlformats.org/presentationml/2006/main">
   <p:cSld>
     <p:spTree>
@@ -7311,7 +9368,7 @@
           <a:p>
             <a:fld id="{330EA680-D336-4FF7-8B7A-9848BB0A1C32}" type="slidenum">
               <a:rPr lang="en-US" smtClean="0"/>
-              <a:t>16</a:t>
+              <a:t>19</a:t>
             </a:fld>
             <a:endParaRPr lang="en-US"/>
           </a:p>
@@ -7734,8 +9791,8 @@
         </p:blipFill>
         <p:spPr>
           <a:xfrm>
-            <a:off x="0" y="4155017"/>
-            <a:ext cx="5446207" cy="2702983"/>
+            <a:off x="0" y="4150719"/>
+            <a:ext cx="5454867" cy="2707281"/>
           </a:xfrm>
           <a:prstGeom prst="rect">
             <a:avLst/>
@@ -8667,7 +10724,11 @@
           <a:lstStyle/>
           <a:p>
             <a:r>
-              <a:rPr lang="en-US" b="1" dirty="0"/>
+              <a:rPr lang="en-US" b="1" dirty="0">
+                <a:highlight>
+                  <a:srgbClr val="FF0000"/>
+                </a:highlight>
+              </a:rPr>
               <a:t>Step 4</a:t>
             </a:r>
           </a:p>
@@ -8759,7 +10820,7 @@
         </p:blipFill>
         <p:spPr>
           <a:xfrm>
-            <a:off x="3291133" y="4006520"/>
+            <a:off x="472219" y="3930806"/>
             <a:ext cx="5446207" cy="2702983"/>
           </a:xfrm>
           <a:prstGeom prst="rect">
@@ -8786,7 +10847,7 @@
         </p:nvSpPr>
         <p:spPr>
           <a:xfrm>
-            <a:off x="3512345" y="5845775"/>
+            <a:off x="693431" y="5770061"/>
             <a:ext cx="5098255" cy="369332"/>
           </a:xfrm>
           <a:prstGeom prst="rect">
@@ -8816,6 +10877,160 @@
               <a:t>Semantic Analysis</a:t>
             </a:r>
             <a:endParaRPr lang="en" dirty="0"/>
+          </a:p>
+        </p:txBody>
+      </p:sp>
+      <p:sp>
+        <p:nvSpPr>
+          <p:cNvPr id="21" name="TextBox 20">
+            <a:extLst>
+              <a:ext uri="{FF2B5EF4-FFF2-40B4-BE49-F238E27FC236}">
+                <a16:creationId xmlns:a16="http://schemas.microsoft.com/office/drawing/2014/main" id="{0490B535-CFF1-1449-BE4E-22C43E7D7AC1}"/>
+              </a:ext>
+            </a:extLst>
+          </p:cNvPr>
+          <p:cNvSpPr txBox="1"/>
+          <p:nvPr/>
+        </p:nvSpPr>
+        <p:spPr>
+          <a:xfrm>
+            <a:off x="6072402" y="3529036"/>
+            <a:ext cx="5797325" cy="3754874"/>
+          </a:xfrm>
+          <a:prstGeom prst="rect">
+            <a:avLst/>
+          </a:prstGeom>
+          <a:noFill/>
+        </p:spPr>
+        <p:txBody>
+          <a:bodyPr wrap="square" rtlCol="0">
+            <a:spAutoFit/>
+          </a:bodyPr>
+          <a:lstStyle/>
+          <a:p>
+            <a:r>
+              <a:rPr lang="en-US" sz="1400" b="1" dirty="0"/>
+              <a:t>Deep Learning Training Process</a:t>
+            </a:r>
+          </a:p>
+          <a:p>
+            <a:endParaRPr lang="en-US" sz="1400" dirty="0"/>
+          </a:p>
+          <a:p>
+            <a:pPr marL="285750" indent="-285750">
+              <a:buFontTx/>
+              <a:buChar char="-"/>
+            </a:pPr>
+            <a:r>
+              <a:rPr lang="en-US" sz="1400" dirty="0"/>
+              <a:t>Weights are randomly initialized in the beginning</a:t>
+            </a:r>
+          </a:p>
+          <a:p>
+            <a:pPr marL="285750" indent="-285750">
+              <a:buFontTx/>
+              <a:buChar char="-"/>
+            </a:pPr>
+            <a:r>
+              <a:rPr lang="en-US" sz="1400" dirty="0"/>
+              <a:t>We know the actual labels</a:t>
+            </a:r>
+          </a:p>
+          <a:p>
+            <a:pPr marL="285750" indent="-285750">
+              <a:buFontTx/>
+              <a:buChar char="-"/>
+            </a:pPr>
+            <a:endParaRPr lang="en-US" sz="1400" dirty="0"/>
+          </a:p>
+          <a:p>
+            <a:r>
+              <a:rPr lang="en-US" sz="1400" dirty="0" err="1"/>
+              <a:t>Model.compile</a:t>
+            </a:r>
+            <a:r>
+              <a:rPr lang="en-US" sz="1400" dirty="0"/>
+              <a:t> -&gt; define the loss function, optimizer</a:t>
+            </a:r>
+          </a:p>
+          <a:p>
+            <a:r>
+              <a:rPr lang="en-US" sz="1400" dirty="0" err="1"/>
+              <a:t>Model.fit</a:t>
+            </a:r>
+            <a:r>
+              <a:rPr lang="en-US" sz="1400" dirty="0"/>
+              <a:t> -&gt; does all the steps below.</a:t>
+            </a:r>
+          </a:p>
+          <a:p>
+            <a:endParaRPr lang="en-US" sz="1400" dirty="0"/>
+          </a:p>
+          <a:p>
+            <a:pPr marL="342900" indent="-342900">
+              <a:buAutoNum type="arabicPeriod"/>
+            </a:pPr>
+            <a:r>
+              <a:rPr lang="en-US" sz="1400" dirty="0"/>
+              <a:t>Input data -&gt; Batch of data = 64 data samples</a:t>
+            </a:r>
+          </a:p>
+          <a:p>
+            <a:pPr marL="342900" indent="-342900">
+              <a:buAutoNum type="arabicPeriod"/>
+            </a:pPr>
+            <a:r>
+              <a:rPr lang="en-US" sz="1400" dirty="0"/>
+              <a:t>We find the predictions.</a:t>
+            </a:r>
+          </a:p>
+          <a:p>
+            <a:pPr marL="342900" indent="-342900">
+              <a:buAutoNum type="arabicPeriod"/>
+            </a:pPr>
+            <a:r>
+              <a:rPr lang="en-US" sz="1400" dirty="0"/>
+              <a:t>We pass the predictions to optimizer (optimizer already knows what the actual labels are.)</a:t>
+            </a:r>
+          </a:p>
+          <a:p>
+            <a:pPr marL="342900" indent="-342900">
+              <a:buAutoNum type="arabicPeriod"/>
+            </a:pPr>
+            <a:r>
+              <a:rPr lang="en-US" sz="1400" dirty="0"/>
+              <a:t>We find the loss between predicted labels and actual labels.</a:t>
+            </a:r>
+          </a:p>
+          <a:p>
+            <a:pPr marL="342900" indent="-342900">
+              <a:buAutoNum type="arabicPeriod"/>
+            </a:pPr>
+            <a:r>
+              <a:rPr lang="en-US" sz="1400" dirty="0"/>
+              <a:t>We tune the “learnable” parameters according to the loss.</a:t>
+            </a:r>
+          </a:p>
+          <a:p>
+            <a:pPr marL="342900" indent="-342900">
+              <a:buAutoNum type="arabicPeriod"/>
+            </a:pPr>
+            <a:r>
+              <a:rPr lang="en-US" sz="1400" dirty="0"/>
+              <a:t>Go back to step 1.</a:t>
+            </a:r>
+          </a:p>
+          <a:p>
+            <a:pPr marL="342900" indent="-342900">
+              <a:buAutoNum type="arabicPeriod"/>
+            </a:pPr>
+            <a:endParaRPr lang="en-US" sz="1400" dirty="0"/>
+          </a:p>
+          <a:p>
+            <a:pPr marL="342900" indent="-342900">
+              <a:buAutoNum type="arabicPeriod"/>
+            </a:pPr>
+            <a:endParaRPr lang="en-US" sz="1400" dirty="0"/>
           </a:p>
         </p:txBody>
       </p:sp>
@@ -8961,6 +11176,9 @@
                 <a:solidFill>
                   <a:srgbClr val="212121"/>
                 </a:solidFill>
+                <a:highlight>
+                  <a:srgbClr val="00FF00"/>
+                </a:highlight>
                 <a:latin typeface="Arial" panose="020B0604020202020204" pitchFamily="34" charset="0"/>
                 <a:cs typeface="Arial" panose="020B0604020202020204" pitchFamily="34" charset="0"/>
               </a:rPr>
@@ -8977,6 +11195,9 @@
                 <a:solidFill>
                   <a:srgbClr val="212121"/>
                 </a:solidFill>
+                <a:highlight>
+                  <a:srgbClr val="00FF00"/>
+                </a:highlight>
                 <a:latin typeface="Arial" panose="020B0604020202020204" pitchFamily="34" charset="0"/>
                 <a:cs typeface="Arial" panose="020B0604020202020204" pitchFamily="34" charset="0"/>
               </a:rPr>
@@ -9029,6 +11250,9 @@
                 <a:solidFill>
                   <a:srgbClr val="212121"/>
                 </a:solidFill>
+                <a:highlight>
+                  <a:srgbClr val="00FF00"/>
+                </a:highlight>
                 <a:latin typeface="Arial" panose="020B0604020202020204" pitchFamily="34" charset="0"/>
                 <a:cs typeface="Arial" panose="020B0604020202020204" pitchFamily="34" charset="0"/>
               </a:rPr>
@@ -9045,6 +11269,9 @@
                 <a:solidFill>
                   <a:srgbClr val="212121"/>
                 </a:solidFill>
+                <a:highlight>
+                  <a:srgbClr val="00FF00"/>
+                </a:highlight>
                 <a:latin typeface="Arial" panose="020B0604020202020204" pitchFamily="34" charset="0"/>
                 <a:cs typeface="Arial" panose="020B0604020202020204" pitchFamily="34" charset="0"/>
               </a:rPr>
@@ -9055,6 +11282,9 @@
                 <a:solidFill>
                   <a:srgbClr val="212121"/>
                 </a:solidFill>
+                <a:highlight>
+                  <a:srgbClr val="00FF00"/>
+                </a:highlight>
                 <a:latin typeface="Arial" panose="020B0604020202020204" pitchFamily="34" charset="0"/>
                 <a:cs typeface="Arial" panose="020B0604020202020204" pitchFamily="34" charset="0"/>
               </a:rPr>
@@ -9065,6 +11295,9 @@
                 <a:solidFill>
                   <a:srgbClr val="212121"/>
                 </a:solidFill>
+                <a:highlight>
+                  <a:srgbClr val="00FF00"/>
+                </a:highlight>
                 <a:latin typeface="Arial" panose="020B0604020202020204" pitchFamily="34" charset="0"/>
                 <a:cs typeface="Arial" panose="020B0604020202020204" pitchFamily="34" charset="0"/>
               </a:rPr>
@@ -9075,6 +11308,9 @@
                 <a:srgbClr val="212121"/>
               </a:solidFill>
               <a:effectLst/>
+              <a:highlight>
+                <a:srgbClr val="00FF00"/>
+              </a:highlight>
               <a:latin typeface="Arial" panose="020B0604020202020204" pitchFamily="34" charset="0"/>
               <a:cs typeface="Arial" panose="020B0604020202020204" pitchFamily="34" charset="0"/>
             </a:endParaRPr>
@@ -9095,7 +11331,7 @@
         </p:nvSpPr>
         <p:spPr>
           <a:xfrm>
-            <a:off x="8520235" y="6492875"/>
+            <a:off x="8262888" y="195848"/>
             <a:ext cx="3576620" cy="338554"/>
           </a:xfrm>
           <a:prstGeom prst="rect">
@@ -9125,35 +11361,6 @@
           </a:p>
         </p:txBody>
       </p:sp>
-      <p:pic>
-        <p:nvPicPr>
-          <p:cNvPr id="7" name="Picture 6">
-            <a:extLst>
-              <a:ext uri="{FF2B5EF4-FFF2-40B4-BE49-F238E27FC236}">
-                <a16:creationId xmlns:a16="http://schemas.microsoft.com/office/drawing/2014/main" id="{025BCAE8-E985-8F45-BEDA-200C2B42CD91}"/>
-              </a:ext>
-            </a:extLst>
-          </p:cNvPr>
-          <p:cNvPicPr>
-            <a:picLocks noChangeAspect="1"/>
-          </p:cNvPicPr>
-          <p:nvPr/>
-        </p:nvPicPr>
-        <p:blipFill rotWithShape="1">
-          <a:blip r:embed="rId3"/>
-          <a:srcRect t="21690"/>
-          <a:stretch/>
-        </p:blipFill>
-        <p:spPr>
-          <a:xfrm>
-            <a:off x="601744" y="5993619"/>
-            <a:ext cx="3235025" cy="206675"/>
-          </a:xfrm>
-          <a:prstGeom prst="rect">
-            <a:avLst/>
-          </a:prstGeom>
-        </p:spPr>
-      </p:pic>
       <p:cxnSp>
         <p:nvCxnSpPr>
           <p:cNvPr id="8" name="Straight Arrow Connector 7">
@@ -9163,13 +11370,15 @@
               </a:ext>
             </a:extLst>
           </p:cNvPr>
-          <p:cNvCxnSpPr/>
+          <p:cNvCxnSpPr>
+            <a:cxnSpLocks/>
+          </p:cNvCxnSpPr>
           <p:nvPr/>
         </p:nvCxnSpPr>
         <p:spPr>
           <a:xfrm>
-            <a:off x="2219257" y="5298510"/>
-            <a:ext cx="0" cy="563671"/>
+            <a:off x="2219256" y="6235109"/>
+            <a:ext cx="1" cy="118031"/>
           </a:xfrm>
           <a:prstGeom prst="straightConnector1">
             <a:avLst/>
@@ -9210,7 +11419,7 @@
         </p:nvSpPr>
         <p:spPr>
           <a:xfrm>
-            <a:off x="5908889" y="4550467"/>
+            <a:off x="5939574" y="4550467"/>
             <a:ext cx="6096000" cy="1815882"/>
           </a:xfrm>
           <a:prstGeom prst="rect">
@@ -9237,6 +11446,9 @@
                 <a:solidFill>
                   <a:srgbClr val="202124"/>
                 </a:solidFill>
+                <a:highlight>
+                  <a:srgbClr val="FFFF00"/>
+                </a:highlight>
                 <a:latin typeface="Roboto" panose="02000000000000000000" pitchFamily="2" charset="0"/>
               </a:rPr>
               <a:t>Standardization</a:t>
@@ -9261,6 +11473,9 @@
                 <a:solidFill>
                   <a:srgbClr val="202124"/>
                 </a:solidFill>
+                <a:highlight>
+                  <a:srgbClr val="FFFF00"/>
+                </a:highlight>
                 <a:latin typeface="Roboto" panose="02000000000000000000" pitchFamily="2" charset="0"/>
               </a:rPr>
               <a:t>Tokenization</a:t>
@@ -9285,6 +11500,9 @@
                 <a:solidFill>
                   <a:srgbClr val="202124"/>
                 </a:solidFill>
+                <a:highlight>
+                  <a:srgbClr val="FFFF00"/>
+                </a:highlight>
                 <a:latin typeface="Roboto" panose="02000000000000000000" pitchFamily="2" charset="0"/>
               </a:rPr>
               <a:t>Vectorization</a:t>
@@ -9322,8 +11540,8 @@
         </p:nvSpPr>
         <p:spPr>
           <a:xfrm>
-            <a:off x="0" y="4574876"/>
-            <a:ext cx="5908889" cy="1292662"/>
+            <a:off x="0" y="3970904"/>
+            <a:ext cx="5908889" cy="2492990"/>
           </a:xfrm>
           <a:prstGeom prst="rect">
             <a:avLst/>
@@ -9336,6 +11554,36 @@
           <a:lstStyle/>
           <a:p>
             <a:endParaRPr lang="en-US" sz="1300" dirty="0"/>
+          </a:p>
+          <a:p>
+            <a:r>
+              <a:rPr lang="en-US" sz="1300" b="1" dirty="0">
+                <a:solidFill>
+                  <a:srgbClr val="212121"/>
+                </a:solidFill>
+                <a:highlight>
+                  <a:srgbClr val="FFFF00"/>
+                </a:highlight>
+                <a:latin typeface="Courier New" panose="02070309020205020404" pitchFamily="49" charset="0"/>
+              </a:rPr>
+              <a:t>Yes it was a little low budget, but this movie shows love!</a:t>
+            </a:r>
+          </a:p>
+          <a:p>
+            <a:endParaRPr lang="en-US" sz="1300" b="1" dirty="0">
+              <a:solidFill>
+                <a:srgbClr val="212121"/>
+              </a:solidFill>
+              <a:latin typeface="Courier New" panose="02070309020205020404" pitchFamily="49" charset="0"/>
+            </a:endParaRPr>
+          </a:p>
+          <a:p>
+            <a:endParaRPr lang="en-US" sz="1300" b="1" dirty="0">
+              <a:solidFill>
+                <a:srgbClr val="212121"/>
+              </a:solidFill>
+              <a:latin typeface="Courier New" panose="02070309020205020404" pitchFamily="49" charset="0"/>
+            </a:endParaRPr>
           </a:p>
           <a:p>
             <a:r>
@@ -9345,8 +11593,17 @@
                 </a:solidFill>
                 <a:latin typeface="Courier New" panose="02070309020205020404" pitchFamily="49" charset="0"/>
               </a:rPr>
-              <a:t>Yes it was a little low budget, but this movie shows love!</a:t>
-            </a:r>
+              <a:t>[yes it was a little low budget but this movie shows love]</a:t>
+            </a:r>
+            <a:endParaRPr lang="en-US" sz="1300" b="1" dirty="0"/>
+          </a:p>
+          <a:p>
+            <a:endParaRPr lang="en-US" sz="1300" b="1" dirty="0">
+              <a:solidFill>
+                <a:srgbClr val="212121"/>
+              </a:solidFill>
+              <a:latin typeface="Courier New" panose="02070309020205020404" pitchFamily="49" charset="0"/>
+            </a:endParaRPr>
           </a:p>
           <a:p>
             <a:r>
@@ -9356,8 +11613,10 @@
                 </a:solidFill>
                 <a:latin typeface="Courier New" panose="02070309020205020404" pitchFamily="49" charset="0"/>
               </a:rPr>
-              <a:t>yes it was a little low budget but this movie shows love</a:t>
-            </a:r>
+              <a:t>[yes, it, was, a, little, low, budget, but, this, movie, shows, love]</a:t>
+            </a:r>
+          </a:p>
+          <a:p>
             <a:endParaRPr lang="en-US" sz="1300" b="1" dirty="0"/>
           </a:p>
           <a:p>
@@ -9368,6 +11627,118 @@
           </a:p>
           <a:p>
             <a:endParaRPr lang="en-US" sz="1300" dirty="0"/>
+          </a:p>
+        </p:txBody>
+      </p:sp>
+      <p:sp>
+        <p:nvSpPr>
+          <p:cNvPr id="11" name="TextBox 10">
+            <a:extLst>
+              <a:ext uri="{FF2B5EF4-FFF2-40B4-BE49-F238E27FC236}">
+                <a16:creationId xmlns:a16="http://schemas.microsoft.com/office/drawing/2014/main" id="{83F045F5-21D0-9D46-8A08-18DE99B90243}"/>
+              </a:ext>
+            </a:extLst>
+          </p:cNvPr>
+          <p:cNvSpPr txBox="1"/>
+          <p:nvPr/>
+        </p:nvSpPr>
+        <p:spPr>
+          <a:xfrm>
+            <a:off x="1399216" y="5843793"/>
+            <a:ext cx="1433406" cy="369332"/>
+          </a:xfrm>
+          <a:prstGeom prst="rect">
+            <a:avLst/>
+          </a:prstGeom>
+          <a:noFill/>
+        </p:spPr>
+        <p:txBody>
+          <a:bodyPr wrap="none" rtlCol="0">
+            <a:spAutoFit/>
+          </a:bodyPr>
+          <a:lstStyle/>
+          <a:p>
+            <a:r>
+              <a:rPr lang="en-US" dirty="0"/>
+              <a:t>Bag of Words</a:t>
+            </a:r>
+          </a:p>
+        </p:txBody>
+      </p:sp>
+      <p:sp>
+        <p:nvSpPr>
+          <p:cNvPr id="12" name="TextBox 11">
+            <a:extLst>
+              <a:ext uri="{FF2B5EF4-FFF2-40B4-BE49-F238E27FC236}">
+                <a16:creationId xmlns:a16="http://schemas.microsoft.com/office/drawing/2014/main" id="{98A4D7C4-91A9-E547-B393-B0C0A2EE6AFA}"/>
+              </a:ext>
+            </a:extLst>
+          </p:cNvPr>
+          <p:cNvSpPr txBox="1"/>
+          <p:nvPr/>
+        </p:nvSpPr>
+        <p:spPr>
+          <a:xfrm>
+            <a:off x="100675" y="6582334"/>
+            <a:ext cx="5724644" cy="246221"/>
+          </a:xfrm>
+          <a:prstGeom prst="rect">
+            <a:avLst/>
+          </a:prstGeom>
+          <a:noFill/>
+        </p:spPr>
+        <p:txBody>
+          <a:bodyPr wrap="none" rtlCol="0">
+            <a:spAutoFit/>
+          </a:bodyPr>
+          <a:lstStyle/>
+          <a:p>
+            <a:r>
+              <a:rPr lang="en-US" sz="1000" b="1" dirty="0">
+                <a:solidFill>
+                  <a:srgbClr val="212121"/>
+                </a:solidFill>
+                <a:latin typeface="Courier New" panose="02070309020205020404" pitchFamily="49" charset="0"/>
+              </a:rPr>
+              <a:t>414 9  10  192 20    25. 200    200. 250 300.   96   20  0 0 0 0 0 0 …</a:t>
+            </a:r>
+            <a:endParaRPr lang="en-US" sz="1000" dirty="0"/>
+          </a:p>
+        </p:txBody>
+      </p:sp>
+      <p:sp>
+        <p:nvSpPr>
+          <p:cNvPr id="13" name="TextBox 12">
+            <a:extLst>
+              <a:ext uri="{FF2B5EF4-FFF2-40B4-BE49-F238E27FC236}">
+                <a16:creationId xmlns:a16="http://schemas.microsoft.com/office/drawing/2014/main" id="{F226B702-CEF5-CF41-ADC0-F0DE844F03AC}"/>
+              </a:ext>
+            </a:extLst>
+          </p:cNvPr>
+          <p:cNvSpPr txBox="1"/>
+          <p:nvPr/>
+        </p:nvSpPr>
+        <p:spPr>
+          <a:xfrm>
+            <a:off x="5908889" y="6492875"/>
+            <a:ext cx="1299587" cy="369332"/>
+          </a:xfrm>
+          <a:prstGeom prst="rect">
+            <a:avLst/>
+          </a:prstGeom>
+          <a:noFill/>
+        </p:spPr>
+        <p:txBody>
+          <a:bodyPr wrap="none" rtlCol="0">
+            <a:spAutoFit/>
+          </a:bodyPr>
+          <a:lstStyle/>
+          <a:p>
+            <a:r>
+              <a:rPr lang="en-US" dirty="0" err="1"/>
+              <a:t>Max_length</a:t>
+            </a:r>
+            <a:endParaRPr lang="en-US" dirty="0"/>
           </a:p>
         </p:txBody>
       </p:sp>
@@ -9403,6 +11774,329 @@
       </p:grpSpPr>
       <p:sp>
         <p:nvSpPr>
+          <p:cNvPr id="5" name="Rectangle 4">
+            <a:extLst>
+              <a:ext uri="{FF2B5EF4-FFF2-40B4-BE49-F238E27FC236}">
+                <a16:creationId xmlns:a16="http://schemas.microsoft.com/office/drawing/2014/main" id="{F70FDFAD-37FD-2A44-84AB-0FA65BE92C8F}"/>
+              </a:ext>
+            </a:extLst>
+          </p:cNvPr>
+          <p:cNvSpPr/>
+          <p:nvPr/>
+        </p:nvSpPr>
+        <p:spPr>
+          <a:xfrm>
+            <a:off x="770735" y="1562421"/>
+            <a:ext cx="8239307" cy="369332"/>
+          </a:xfrm>
+          <a:prstGeom prst="rect">
+            <a:avLst/>
+          </a:prstGeom>
+        </p:spPr>
+        <p:txBody>
+          <a:bodyPr wrap="square">
+            <a:spAutoFit/>
+          </a:bodyPr>
+          <a:lstStyle/>
+          <a:p>
+            <a:r>
+              <a:rPr lang="en-US" b="1" dirty="0">
+                <a:solidFill>
+                  <a:srgbClr val="212121"/>
+                </a:solidFill>
+                <a:highlight>
+                  <a:srgbClr val="FFFF00"/>
+                </a:highlight>
+                <a:latin typeface="Courier New" panose="02070309020205020404" pitchFamily="49" charset="0"/>
+              </a:rPr>
+              <a:t>Yes</a:t>
+            </a:r>
+            <a:r>
+              <a:rPr lang="en-US" b="1" dirty="0">
+                <a:solidFill>
+                  <a:srgbClr val="212121"/>
+                </a:solidFill>
+                <a:latin typeface="Courier New" panose="02070309020205020404" pitchFamily="49" charset="0"/>
+              </a:rPr>
+              <a:t> </a:t>
+            </a:r>
+            <a:r>
+              <a:rPr lang="en-US" b="1" dirty="0">
+                <a:solidFill>
+                  <a:srgbClr val="212121"/>
+                </a:solidFill>
+                <a:highlight>
+                  <a:srgbClr val="FFFF00"/>
+                </a:highlight>
+                <a:latin typeface="Courier New" panose="02070309020205020404" pitchFamily="49" charset="0"/>
+              </a:rPr>
+              <a:t>it</a:t>
+            </a:r>
+            <a:r>
+              <a:rPr lang="en-US" b="1" dirty="0">
+                <a:solidFill>
+                  <a:srgbClr val="212121"/>
+                </a:solidFill>
+                <a:latin typeface="Courier New" panose="02070309020205020404" pitchFamily="49" charset="0"/>
+              </a:rPr>
+              <a:t> was a little low budget, but this movie shows love!</a:t>
+            </a:r>
+          </a:p>
+        </p:txBody>
+      </p:sp>
+      <p:sp>
+        <p:nvSpPr>
+          <p:cNvPr id="6" name="TextBox 5">
+            <a:extLst>
+              <a:ext uri="{FF2B5EF4-FFF2-40B4-BE49-F238E27FC236}">
+                <a16:creationId xmlns:a16="http://schemas.microsoft.com/office/drawing/2014/main" id="{8490DAC9-17D1-D14A-9745-863D5157ADB5}"/>
+              </a:ext>
+            </a:extLst>
+          </p:cNvPr>
+          <p:cNvSpPr txBox="1"/>
+          <p:nvPr/>
+        </p:nvSpPr>
+        <p:spPr>
+          <a:xfrm>
+            <a:off x="10425325" y="1562421"/>
+            <a:ext cx="301686" cy="369332"/>
+          </a:xfrm>
+          <a:prstGeom prst="rect">
+            <a:avLst/>
+          </a:prstGeom>
+          <a:noFill/>
+        </p:spPr>
+        <p:txBody>
+          <a:bodyPr wrap="none" rtlCol="0">
+            <a:spAutoFit/>
+          </a:bodyPr>
+          <a:lstStyle/>
+          <a:p>
+            <a:r>
+              <a:rPr lang="en-US" dirty="0"/>
+              <a:t>1</a:t>
+            </a:r>
+          </a:p>
+        </p:txBody>
+      </p:sp>
+      <p:sp>
+        <p:nvSpPr>
+          <p:cNvPr id="7" name="TextBox 6">
+            <a:extLst>
+              <a:ext uri="{FF2B5EF4-FFF2-40B4-BE49-F238E27FC236}">
+                <a16:creationId xmlns:a16="http://schemas.microsoft.com/office/drawing/2014/main" id="{8F89C67C-10DC-1D4B-9076-2FBBCA011256}"/>
+              </a:ext>
+            </a:extLst>
+          </p:cNvPr>
+          <p:cNvSpPr txBox="1"/>
+          <p:nvPr/>
+        </p:nvSpPr>
+        <p:spPr>
+          <a:xfrm>
+            <a:off x="3284851" y="995939"/>
+            <a:ext cx="1587486" cy="369332"/>
+          </a:xfrm>
+          <a:prstGeom prst="rect">
+            <a:avLst/>
+          </a:prstGeom>
+          <a:noFill/>
+        </p:spPr>
+        <p:txBody>
+          <a:bodyPr wrap="none" rtlCol="0">
+            <a:spAutoFit/>
+          </a:bodyPr>
+          <a:lstStyle/>
+          <a:p>
+            <a:r>
+              <a:rPr lang="en-US" dirty="0"/>
+              <a:t>Input sentence</a:t>
+            </a:r>
+          </a:p>
+        </p:txBody>
+      </p:sp>
+      <p:sp>
+        <p:nvSpPr>
+          <p:cNvPr id="8" name="TextBox 7">
+            <a:extLst>
+              <a:ext uri="{FF2B5EF4-FFF2-40B4-BE49-F238E27FC236}">
+                <a16:creationId xmlns:a16="http://schemas.microsoft.com/office/drawing/2014/main" id="{CE374197-F78D-D843-876B-001B1CC89A66}"/>
+              </a:ext>
+            </a:extLst>
+          </p:cNvPr>
+          <p:cNvSpPr txBox="1"/>
+          <p:nvPr/>
+        </p:nvSpPr>
+        <p:spPr>
+          <a:xfrm>
+            <a:off x="10291368" y="1071654"/>
+            <a:ext cx="638316" cy="369332"/>
+          </a:xfrm>
+          <a:prstGeom prst="rect">
+            <a:avLst/>
+          </a:prstGeom>
+          <a:noFill/>
+        </p:spPr>
+        <p:txBody>
+          <a:bodyPr wrap="none" rtlCol="0">
+            <a:spAutoFit/>
+          </a:bodyPr>
+          <a:lstStyle/>
+          <a:p>
+            <a:r>
+              <a:rPr lang="en-US" dirty="0"/>
+              <a:t>label</a:t>
+            </a:r>
+          </a:p>
+        </p:txBody>
+      </p:sp>
+      <p:pic>
+        <p:nvPicPr>
+          <p:cNvPr id="9" name="Picture 8">
+            <a:extLst>
+              <a:ext uri="{FF2B5EF4-FFF2-40B4-BE49-F238E27FC236}">
+                <a16:creationId xmlns:a16="http://schemas.microsoft.com/office/drawing/2014/main" id="{D4ED2768-F27E-BF4B-84B3-1159836F7CE3}"/>
+              </a:ext>
+            </a:extLst>
+          </p:cNvPr>
+          <p:cNvPicPr>
+            <a:picLocks noChangeAspect="1"/>
+          </p:cNvPicPr>
+          <p:nvPr/>
+        </p:nvPicPr>
+        <p:blipFill rotWithShape="1">
+          <a:blip r:embed="rId2"/>
+          <a:srcRect t="21690"/>
+          <a:stretch/>
+        </p:blipFill>
+        <p:spPr>
+          <a:xfrm>
+            <a:off x="3181866" y="3325662"/>
+            <a:ext cx="3235025" cy="206675"/>
+          </a:xfrm>
+          <a:prstGeom prst="rect">
+            <a:avLst/>
+          </a:prstGeom>
+        </p:spPr>
+      </p:pic>
+      <p:sp>
+        <p:nvSpPr>
+          <p:cNvPr id="10" name="Rounded Rectangle 9">
+            <a:extLst>
+              <a:ext uri="{FF2B5EF4-FFF2-40B4-BE49-F238E27FC236}">
+                <a16:creationId xmlns:a16="http://schemas.microsoft.com/office/drawing/2014/main" id="{5DE38B86-B43D-5C4C-AE6E-923FBA13E4D2}"/>
+              </a:ext>
+            </a:extLst>
+          </p:cNvPr>
+          <p:cNvSpPr/>
+          <p:nvPr/>
+        </p:nvSpPr>
+        <p:spPr>
+          <a:xfrm>
+            <a:off x="3098476" y="2283088"/>
+            <a:ext cx="3733315" cy="419343"/>
+          </a:xfrm>
+          <a:prstGeom prst="roundRect">
+            <a:avLst/>
+          </a:prstGeom>
+          <a:solidFill>
+            <a:schemeClr val="accent6"/>
+          </a:solidFill>
+        </p:spPr>
+        <p:style>
+          <a:lnRef idx="2">
+            <a:schemeClr val="accent1">
+              <a:shade val="50000"/>
+            </a:schemeClr>
+          </a:lnRef>
+          <a:fillRef idx="1">
+            <a:schemeClr val="accent1"/>
+          </a:fillRef>
+          <a:effectRef idx="0">
+            <a:schemeClr val="accent1"/>
+          </a:effectRef>
+          <a:fontRef idx="minor">
+            <a:schemeClr val="lt1"/>
+          </a:fontRef>
+        </p:style>
+        <p:txBody>
+          <a:bodyPr rtlCol="0" anchor="ctr"/>
+          <a:lstStyle/>
+          <a:p>
+            <a:pPr algn="ctr"/>
+            <a:r>
+              <a:rPr lang="en-US" dirty="0"/>
+              <a:t>Text Encoder</a:t>
+            </a:r>
+          </a:p>
+        </p:txBody>
+      </p:sp>
+      <p:sp>
+        <p:nvSpPr>
+          <p:cNvPr id="11" name="TextBox 10">
+            <a:extLst>
+              <a:ext uri="{FF2B5EF4-FFF2-40B4-BE49-F238E27FC236}">
+                <a16:creationId xmlns:a16="http://schemas.microsoft.com/office/drawing/2014/main" id="{2FB32903-AD9F-BF40-8715-FB660938AC7E}"/>
+              </a:ext>
+            </a:extLst>
+          </p:cNvPr>
+          <p:cNvSpPr txBox="1"/>
+          <p:nvPr/>
+        </p:nvSpPr>
+        <p:spPr>
+          <a:xfrm>
+            <a:off x="7487034" y="2333099"/>
+            <a:ext cx="4412298" cy="369332"/>
+          </a:xfrm>
+          <a:prstGeom prst="rect">
+            <a:avLst/>
+          </a:prstGeom>
+          <a:noFill/>
+        </p:spPr>
+        <p:txBody>
+          <a:bodyPr wrap="none" rtlCol="0">
+            <a:spAutoFit/>
+          </a:bodyPr>
+          <a:lstStyle/>
+          <a:p>
+            <a:r>
+              <a:rPr lang="en-US" dirty="0"/>
+              <a:t>- Vocabulary (** 1000 words ) – VOCAB SIZE</a:t>
+            </a:r>
+          </a:p>
+        </p:txBody>
+      </p:sp>
+    </p:spTree>
+    <p:extLst>
+      <p:ext uri="{BB962C8B-B14F-4D97-AF65-F5344CB8AC3E}">
+        <p14:creationId xmlns:p14="http://schemas.microsoft.com/office/powerpoint/2010/main" val="2575954471"/>
+      </p:ext>
+    </p:extLst>
+  </p:cSld>
+  <p:clrMapOvr>
+    <a:masterClrMapping/>
+  </p:clrMapOvr>
+</p:sld>
+</file>
+
+<file path=ppt/slides/slide7.xml><?xml version="1.0" encoding="utf-8"?>
+<p:sld xmlns:a="http://schemas.openxmlformats.org/drawingml/2006/main" xmlns:r="http://schemas.openxmlformats.org/officeDocument/2006/relationships" xmlns:p="http://schemas.openxmlformats.org/presentationml/2006/main">
+  <p:cSld>
+    <p:spTree>
+      <p:nvGrpSpPr>
+        <p:cNvPr id="1" name=""/>
+        <p:cNvGrpSpPr/>
+        <p:nvPr/>
+      </p:nvGrpSpPr>
+      <p:grpSpPr>
+        <a:xfrm>
+          <a:off x="0" y="0"/>
+          <a:ext cx="0" cy="0"/>
+          <a:chOff x="0" y="0"/>
+          <a:chExt cx="0" cy="0"/>
+        </a:xfrm>
+      </p:grpSpPr>
+      <p:sp>
+        <p:nvSpPr>
           <p:cNvPr id="2" name="Title 1">
             <a:extLst>
               <a:ext uri="{FF2B5EF4-FFF2-40B4-BE49-F238E27FC236}">
@@ -9452,7 +12146,7 @@
           <a:p>
             <a:fld id="{330EA680-D336-4FF7-8B7A-9848BB0A1C32}" type="slidenum">
               <a:rPr lang="en-US" smtClean="0"/>
-              <a:t>6</a:t>
+              <a:t>7</a:t>
             </a:fld>
             <a:endParaRPr lang="en-US"/>
           </a:p>
@@ -9823,123 +12517,6 @@
 </p:sld>
 </file>
 
-<file path=ppt/slides/slide7.xml><?xml version="1.0" encoding="utf-8"?>
-<p:sld xmlns:a="http://schemas.openxmlformats.org/drawingml/2006/main" xmlns:r="http://schemas.openxmlformats.org/officeDocument/2006/relationships" xmlns:p="http://schemas.openxmlformats.org/presentationml/2006/main">
-  <p:cSld>
-    <p:spTree>
-      <p:nvGrpSpPr>
-        <p:cNvPr id="1" name=""/>
-        <p:cNvGrpSpPr/>
-        <p:nvPr/>
-      </p:nvGrpSpPr>
-      <p:grpSpPr>
-        <a:xfrm>
-          <a:off x="0" y="0"/>
-          <a:ext cx="0" cy="0"/>
-          <a:chOff x="0" y="0"/>
-          <a:chExt cx="0" cy="0"/>
-        </a:xfrm>
-      </p:grpSpPr>
-      <p:sp>
-        <p:nvSpPr>
-          <p:cNvPr id="2" name="Title 1">
-            <a:extLst>
-              <a:ext uri="{FF2B5EF4-FFF2-40B4-BE49-F238E27FC236}">
-                <a16:creationId xmlns:a16="http://schemas.microsoft.com/office/drawing/2014/main" id="{1E080E88-7716-BC42-9074-7CDA56B26EB8}"/>
-              </a:ext>
-            </a:extLst>
-          </p:cNvPr>
-          <p:cNvSpPr>
-            <a:spLocks noGrp="1"/>
-          </p:cNvSpPr>
-          <p:nvPr>
-            <p:ph type="title"/>
-          </p:nvPr>
-        </p:nvSpPr>
-        <p:spPr/>
-        <p:txBody>
-          <a:bodyPr/>
-          <a:lstStyle/>
-          <a:p>
-            <a:r>
-              <a:rPr lang="en-US" dirty="0"/>
-              <a:t>Step 2: Visualize the dataset</a:t>
-            </a:r>
-          </a:p>
-        </p:txBody>
-      </p:sp>
-      <p:sp>
-        <p:nvSpPr>
-          <p:cNvPr id="4" name="Slide Number Placeholder 3">
-            <a:extLst>
-              <a:ext uri="{FF2B5EF4-FFF2-40B4-BE49-F238E27FC236}">
-                <a16:creationId xmlns:a16="http://schemas.microsoft.com/office/drawing/2014/main" id="{A7040817-06FB-D043-9D39-5E9F37E613DE}"/>
-              </a:ext>
-            </a:extLst>
-          </p:cNvPr>
-          <p:cNvSpPr>
-            <a:spLocks noGrp="1"/>
-          </p:cNvSpPr>
-          <p:nvPr>
-            <p:ph type="sldNum" sz="quarter" idx="12"/>
-          </p:nvPr>
-        </p:nvSpPr>
-        <p:spPr/>
-        <p:txBody>
-          <a:bodyPr/>
-          <a:lstStyle/>
-          <a:p>
-            <a:fld id="{330EA680-D336-4FF7-8B7A-9848BB0A1C32}" type="slidenum">
-              <a:rPr lang="en-US" smtClean="0"/>
-              <a:t>7</a:t>
-            </a:fld>
-            <a:endParaRPr lang="en-US"/>
-          </a:p>
-        </p:txBody>
-      </p:sp>
-      <p:pic>
-        <p:nvPicPr>
-          <p:cNvPr id="5" name="Picture 4">
-            <a:extLst>
-              <a:ext uri="{FF2B5EF4-FFF2-40B4-BE49-F238E27FC236}">
-                <a16:creationId xmlns:a16="http://schemas.microsoft.com/office/drawing/2014/main" id="{6D75579C-809A-604D-994B-9B60BD9DAA70}"/>
-              </a:ext>
-            </a:extLst>
-          </p:cNvPr>
-          <p:cNvPicPr>
-            <a:picLocks noChangeAspect="1"/>
-          </p:cNvPicPr>
-          <p:nvPr/>
-        </p:nvPicPr>
-        <p:blipFill>
-          <a:blip r:embed="rId2"/>
-          <a:stretch>
-            <a:fillRect/>
-          </a:stretch>
-        </p:blipFill>
-        <p:spPr>
-          <a:xfrm>
-            <a:off x="1001633" y="1580960"/>
-            <a:ext cx="8870839" cy="5205268"/>
-          </a:xfrm>
-          <a:prstGeom prst="rect">
-            <a:avLst/>
-          </a:prstGeom>
-        </p:spPr>
-      </p:pic>
-    </p:spTree>
-    <p:extLst>
-      <p:ext uri="{BB962C8B-B14F-4D97-AF65-F5344CB8AC3E}">
-        <p14:creationId xmlns:p14="http://schemas.microsoft.com/office/powerpoint/2010/main" val="2724936194"/>
-      </p:ext>
-    </p:extLst>
-  </p:cSld>
-  <p:clrMapOvr>
-    <a:masterClrMapping/>
-  </p:clrMapOvr>
-</p:sld>
-</file>
-
 <file path=ppt/slides/slide8.xml><?xml version="1.0" encoding="utf-8"?>
 <p:sld xmlns:a="http://schemas.openxmlformats.org/drawingml/2006/main" xmlns:r="http://schemas.openxmlformats.org/officeDocument/2006/relationships" xmlns:p="http://schemas.openxmlformats.org/presentationml/2006/main">
   <p:cSld>
@@ -9962,7 +12539,7 @@
           <p:cNvPr id="2" name="Title 1">
             <a:extLst>
               <a:ext uri="{FF2B5EF4-FFF2-40B4-BE49-F238E27FC236}">
-                <a16:creationId xmlns:a16="http://schemas.microsoft.com/office/drawing/2014/main" id="{41C1E090-4686-F24F-8C81-A1B55C4EDFF7}"/>
+                <a16:creationId xmlns:a16="http://schemas.microsoft.com/office/drawing/2014/main" id="{1E080E88-7716-BC42-9074-7CDA56B26EB8}"/>
               </a:ext>
             </a:extLst>
           </p:cNvPr>
@@ -9980,7 +12557,7 @@
           <a:p>
             <a:r>
               <a:rPr lang="en-US" dirty="0"/>
-              <a:t>Step 3: Design the NLP Model</a:t>
+              <a:t>Step 2: Visualize the dataset</a:t>
             </a:r>
           </a:p>
         </p:txBody>
@@ -9990,7 +12567,7 @@
           <p:cNvPr id="4" name="Slide Number Placeholder 3">
             <a:extLst>
               <a:ext uri="{FF2B5EF4-FFF2-40B4-BE49-F238E27FC236}">
-                <a16:creationId xmlns:a16="http://schemas.microsoft.com/office/drawing/2014/main" id="{3C207B77-F25D-9D44-AC80-8B8F2409C0BA}"/>
+                <a16:creationId xmlns:a16="http://schemas.microsoft.com/office/drawing/2014/main" id="{A7040817-06FB-D043-9D39-5E9F37E613DE}"/>
               </a:ext>
             </a:extLst>
           </p:cNvPr>
@@ -10014,100 +12591,12 @@
           </a:p>
         </p:txBody>
       </p:sp>
-      <p:sp>
-        <p:nvSpPr>
-          <p:cNvPr id="5" name="Content Placeholder 2">
-            <a:extLst>
-              <a:ext uri="{FF2B5EF4-FFF2-40B4-BE49-F238E27FC236}">
-                <a16:creationId xmlns:a16="http://schemas.microsoft.com/office/drawing/2014/main" id="{DA0C2C2A-924C-0E43-94C6-FCDDDEC4D598}"/>
-              </a:ext>
-            </a:extLst>
-          </p:cNvPr>
-          <p:cNvSpPr>
-            <a:spLocks noGrp="1"/>
-          </p:cNvSpPr>
-          <p:nvPr>
-            <p:ph idx="1"/>
-          </p:nvPr>
-        </p:nvSpPr>
-        <p:spPr>
-          <a:xfrm>
-            <a:off x="4918364" y="4670425"/>
-            <a:ext cx="6781800" cy="1506538"/>
-          </a:xfrm>
-        </p:spPr>
-        <p:txBody>
-          <a:bodyPr>
-            <a:normAutofit/>
-          </a:bodyPr>
-          <a:lstStyle/>
-          <a:p>
-            <a:pPr marL="0" indent="0">
-              <a:buNone/>
-            </a:pPr>
-            <a:r>
-              <a:rPr lang="en-US" sz="1400" dirty="0">
-                <a:latin typeface="Arial" panose="020B0604020202020204" pitchFamily="34" charset="0"/>
-                <a:cs typeface="Arial" panose="020B0604020202020204" pitchFamily="34" charset="0"/>
-              </a:rPr>
-              <a:t>The output of the Bidirectional RNN is passed to a Dense layer with 64 nodes, and then further passed to the output layer for final binary classification.</a:t>
-            </a:r>
-          </a:p>
-        </p:txBody>
-      </p:sp>
       <p:pic>
         <p:nvPicPr>
-          <p:cNvPr id="6" name="Picture 2" descr="A drawing of the information flow in the model">
-            <a:extLst>
-              <a:ext uri="{FF2B5EF4-FFF2-40B4-BE49-F238E27FC236}">
-                <a16:creationId xmlns:a16="http://schemas.microsoft.com/office/drawing/2014/main" id="{556F203C-9E5E-A64A-812F-AC3949D853B1}"/>
-              </a:ext>
-            </a:extLst>
-          </p:cNvPr>
-          <p:cNvPicPr>
-            <a:picLocks noChangeAspect="1" noChangeArrowheads="1"/>
-          </p:cNvPicPr>
-          <p:nvPr/>
-        </p:nvPicPr>
-        <p:blipFill>
-          <a:blip r:embed="rId2">
-            <a:extLst>
-              <a:ext uri="{28A0092B-C50C-407E-A947-70E740481C1C}">
-                <a14:useLocalDpi xmlns:a14="http://schemas.microsoft.com/office/drawing/2010/main" val="0"/>
-              </a:ext>
-            </a:extLst>
-          </a:blip>
-          <a:srcRect/>
-          <a:stretch>
-            <a:fillRect/>
-          </a:stretch>
-        </p:blipFill>
-        <p:spPr bwMode="auto">
-          <a:xfrm>
-            <a:off x="-132627" y="1690688"/>
-            <a:ext cx="4850099" cy="5124097"/>
-          </a:xfrm>
-          <a:prstGeom prst="rect">
-            <a:avLst/>
-          </a:prstGeom>
-          <a:noFill/>
-          <a:extLst>
-            <a:ext uri="{909E8E84-426E-40DD-AFC4-6F175D3DCCD1}">
-              <a14:hiddenFill xmlns:a14="http://schemas.microsoft.com/office/drawing/2010/main">
-                <a:solidFill>
-                  <a:srgbClr val="FFFFFF"/>
-                </a:solidFill>
-              </a14:hiddenFill>
-            </a:ext>
-          </a:extLst>
-        </p:spPr>
-      </p:pic>
-      <p:pic>
-        <p:nvPicPr>
-          <p:cNvPr id="7" name="Picture 6">
-            <a:extLst>
-              <a:ext uri="{FF2B5EF4-FFF2-40B4-BE49-F238E27FC236}">
-                <a16:creationId xmlns:a16="http://schemas.microsoft.com/office/drawing/2014/main" id="{350C7F16-301A-ED42-BDB9-B5B20C149F50}"/>
+          <p:cNvPr id="5" name="Picture 4">
+            <a:extLst>
+              <a:ext uri="{FF2B5EF4-FFF2-40B4-BE49-F238E27FC236}">
+                <a16:creationId xmlns:a16="http://schemas.microsoft.com/office/drawing/2014/main" id="{6D75579C-809A-604D-994B-9B60BD9DAA70}"/>
               </a:ext>
             </a:extLst>
           </p:cNvPr>
@@ -10117,25 +12606,95 @@
           <p:nvPr/>
         </p:nvPicPr>
         <p:blipFill>
-          <a:blip r:embed="rId3"/>
+          <a:blip r:embed="rId2"/>
           <a:stretch>
             <a:fillRect/>
           </a:stretch>
         </p:blipFill>
         <p:spPr>
           <a:xfrm>
-            <a:off x="4918364" y="1825625"/>
-            <a:ext cx="6781800" cy="2844800"/>
+            <a:off x="1001633" y="1580960"/>
+            <a:ext cx="8870839" cy="5205268"/>
           </a:xfrm>
           <a:prstGeom prst="rect">
             <a:avLst/>
           </a:prstGeom>
         </p:spPr>
       </p:pic>
+      <p:sp>
+        <p:nvSpPr>
+          <p:cNvPr id="3" name="TextBox 2">
+            <a:extLst>
+              <a:ext uri="{FF2B5EF4-FFF2-40B4-BE49-F238E27FC236}">
+                <a16:creationId xmlns:a16="http://schemas.microsoft.com/office/drawing/2014/main" id="{FFAD65AA-D1F9-2F41-A775-9FFEC996BDDB}"/>
+              </a:ext>
+            </a:extLst>
+          </p:cNvPr>
+          <p:cNvSpPr txBox="1"/>
+          <p:nvPr/>
+        </p:nvSpPr>
+        <p:spPr>
+          <a:xfrm>
+            <a:off x="5928258" y="3684460"/>
+            <a:ext cx="1803892" cy="369332"/>
+          </a:xfrm>
+          <a:prstGeom prst="rect">
+            <a:avLst/>
+          </a:prstGeom>
+          <a:noFill/>
+        </p:spPr>
+        <p:txBody>
+          <a:bodyPr wrap="none" rtlCol="0">
+            <a:spAutoFit/>
+          </a:bodyPr>
+          <a:lstStyle/>
+          <a:p>
+            <a:r>
+              <a:rPr lang="en-US" dirty="0"/>
+              <a:t>1000 VOCAB SIZE</a:t>
+            </a:r>
+          </a:p>
+        </p:txBody>
+      </p:sp>
+      <p:sp>
+        <p:nvSpPr>
+          <p:cNvPr id="6" name="TextBox 5">
+            <a:extLst>
+              <a:ext uri="{FF2B5EF4-FFF2-40B4-BE49-F238E27FC236}">
+                <a16:creationId xmlns:a16="http://schemas.microsoft.com/office/drawing/2014/main" id="{1364C2FE-C22C-2E41-B65B-AB3011E31978}"/>
+              </a:ext>
+            </a:extLst>
+          </p:cNvPr>
+          <p:cNvSpPr txBox="1"/>
+          <p:nvPr/>
+        </p:nvSpPr>
+        <p:spPr>
+          <a:xfrm>
+            <a:off x="5393208" y="4053792"/>
+            <a:ext cx="2873992" cy="369332"/>
+          </a:xfrm>
+          <a:prstGeom prst="rect">
+            <a:avLst/>
+          </a:prstGeom>
+          <a:noFill/>
+        </p:spPr>
+        <p:txBody>
+          <a:bodyPr wrap="none" rtlCol="0">
+            <a:spAutoFit/>
+          </a:bodyPr>
+          <a:lstStyle/>
+          <a:p>
+            <a:r>
+              <a:rPr lang="en-US" dirty="0"/>
+              <a:t>Word Count or Bag of Words</a:t>
+            </a:r>
+          </a:p>
+        </p:txBody>
+      </p:sp>
     </p:spTree>
     <p:extLst>
       <p:ext uri="{BB962C8B-B14F-4D97-AF65-F5344CB8AC3E}">
-        <p14:creationId xmlns:p14="http://schemas.microsoft.com/office/powerpoint/2010/main" val="2176830275"/>
+        <p14:creationId xmlns:p14="http://schemas.microsoft.com/office/powerpoint/2010/main" val="2724936194"/>
       </p:ext>
     </p:extLst>
   </p:cSld>
@@ -10167,7 +12726,7 @@
           <p:cNvPr id="2" name="Title 1">
             <a:extLst>
               <a:ext uri="{FF2B5EF4-FFF2-40B4-BE49-F238E27FC236}">
-                <a16:creationId xmlns:a16="http://schemas.microsoft.com/office/drawing/2014/main" id="{75682126-7819-4345-810B-C3E986181943}"/>
+                <a16:creationId xmlns:a16="http://schemas.microsoft.com/office/drawing/2014/main" id="{41C1E090-4686-F24F-8C81-A1B55C4EDFF7}"/>
               </a:ext>
             </a:extLst>
           </p:cNvPr>
@@ -10185,7 +12744,7 @@
           <a:p>
             <a:r>
               <a:rPr lang="en-US" dirty="0"/>
-              <a:t>Step 4: Train the NLP Model</a:t>
+              <a:t>Step 3: Design the NLP Model</a:t>
             </a:r>
           </a:p>
         </p:txBody>
@@ -10195,7 +12754,7 @@
           <p:cNvPr id="4" name="Slide Number Placeholder 3">
             <a:extLst>
               <a:ext uri="{FF2B5EF4-FFF2-40B4-BE49-F238E27FC236}">
-                <a16:creationId xmlns:a16="http://schemas.microsoft.com/office/drawing/2014/main" id="{CE4740FF-2A97-E741-9DD7-8A0B10835784}"/>
+                <a16:creationId xmlns:a16="http://schemas.microsoft.com/office/drawing/2014/main" id="{3C207B77-F25D-9D44-AC80-8B8F2409C0BA}"/>
               </a:ext>
             </a:extLst>
           </p:cNvPr>
@@ -10224,7 +12783,7 @@
           <p:cNvPr id="5" name="Content Placeholder 2">
             <a:extLst>
               <a:ext uri="{FF2B5EF4-FFF2-40B4-BE49-F238E27FC236}">
-                <a16:creationId xmlns:a16="http://schemas.microsoft.com/office/drawing/2014/main" id="{9F648C27-C7E0-1F4B-8BEB-82784C3C0D0B}"/>
+                <a16:creationId xmlns:a16="http://schemas.microsoft.com/office/drawing/2014/main" id="{DA0C2C2A-924C-0E43-94C6-FCDDDEC4D598}"/>
               </a:ext>
             </a:extLst>
           </p:cNvPr>
@@ -10237,8 +12796,8 @@
         </p:nvSpPr>
         <p:spPr>
           <a:xfrm>
-            <a:off x="838200" y="2900361"/>
-            <a:ext cx="10515600" cy="3276601"/>
+            <a:off x="4918364" y="4670425"/>
+            <a:ext cx="6781800" cy="1506538"/>
           </a:xfrm>
         </p:spPr>
         <p:txBody>
@@ -10251,43 +12810,149 @@
               <a:buNone/>
             </a:pPr>
             <a:r>
-              <a:rPr lang="en-US" sz="1600" dirty="0">
+              <a:rPr lang="en-US" sz="1400" dirty="0">
                 <a:latin typeface="Arial" panose="020B0604020202020204" pitchFamily="34" charset="0"/>
                 <a:cs typeface="Arial" panose="020B0604020202020204" pitchFamily="34" charset="0"/>
               </a:rPr>
-              <a:t>Once we have defined the model, now we can compile the model with the loss and optimizer functions just like we did for the DNN and CNN examples last week. We can then fit the model on the train dataset to train the embedding layer, RNN, and dense layers. Note that the RNN layer has multiple layers inside which enables the temporal or sequential nature of learning. The overall parameters of the model is thus dependent on the embedding size, number and size of RNN layers, and the number and size of dense layers.</a:t>
-            </a:r>
+              <a:t>The output of the Bidirectional RNN is passed to a Dense layer with 64 nodes, and then further passed to the output layer for final binary classification.</a:t>
+            </a:r>
+          </a:p>
+          <a:p>
+            <a:pPr marL="0" indent="0">
+              <a:buNone/>
+            </a:pPr>
+            <a:r>
+              <a:rPr lang="en-US" sz="1400" dirty="0">
+                <a:latin typeface="Arial" panose="020B0604020202020204" pitchFamily="34" charset="0"/>
+                <a:cs typeface="Arial" panose="020B0604020202020204" pitchFamily="34" charset="0"/>
+              </a:rPr>
+              <a:t>2</a:t>
+            </a:r>
+            <a:r>
+              <a:rPr lang="en-US" sz="1400" baseline="30000" dirty="0">
+                <a:latin typeface="Arial" panose="020B0604020202020204" pitchFamily="34" charset="0"/>
+                <a:cs typeface="Arial" panose="020B0604020202020204" pitchFamily="34" charset="0"/>
+              </a:rPr>
+              <a:t>nd</a:t>
+            </a:r>
+            <a:r>
+              <a:rPr lang="en-US" sz="1400" dirty="0">
+                <a:latin typeface="Arial" panose="020B0604020202020204" pitchFamily="34" charset="0"/>
+                <a:cs typeface="Arial" panose="020B0604020202020204" pitchFamily="34" charset="0"/>
+              </a:rPr>
+              <a:t> word is processed based on the embedding at 2</a:t>
+            </a:r>
+            <a:r>
+              <a:rPr lang="en-US" sz="1400" baseline="30000" dirty="0">
+                <a:latin typeface="Arial" panose="020B0604020202020204" pitchFamily="34" charset="0"/>
+                <a:cs typeface="Arial" panose="020B0604020202020204" pitchFamily="34" charset="0"/>
+              </a:rPr>
+              <a:t>nd</a:t>
+            </a:r>
+            <a:r>
+              <a:rPr lang="en-US" sz="1400" dirty="0">
+                <a:latin typeface="Arial" panose="020B0604020202020204" pitchFamily="34" charset="0"/>
+                <a:cs typeface="Arial" panose="020B0604020202020204" pitchFamily="34" charset="0"/>
+              </a:rPr>
+              <a:t> location in sentence as well as the output of the first word..</a:t>
+            </a:r>
+          </a:p>
+          <a:p>
+            <a:pPr marL="0" indent="0">
+              <a:buNone/>
+            </a:pPr>
+            <a:r>
+              <a:rPr lang="en-US" sz="1400" dirty="0">
+                <a:latin typeface="Arial" panose="020B0604020202020204" pitchFamily="34" charset="0"/>
+                <a:cs typeface="Arial" panose="020B0604020202020204" pitchFamily="34" charset="0"/>
+              </a:rPr>
+              <a:t>3</a:t>
+            </a:r>
+            <a:r>
+              <a:rPr lang="en-US" sz="1400" baseline="30000" dirty="0">
+                <a:latin typeface="Arial" panose="020B0604020202020204" pitchFamily="34" charset="0"/>
+                <a:cs typeface="Arial" panose="020B0604020202020204" pitchFamily="34" charset="0"/>
+              </a:rPr>
+              <a:t>rd</a:t>
+            </a:r>
+            <a:r>
+              <a:rPr lang="en-US" sz="1400" dirty="0">
+                <a:latin typeface="Arial" panose="020B0604020202020204" pitchFamily="34" charset="0"/>
+                <a:cs typeface="Arial" panose="020B0604020202020204" pitchFamily="34" charset="0"/>
+              </a:rPr>
+              <a:t> word is processed based on the embedding at the 3</a:t>
+            </a:r>
+            <a:r>
+              <a:rPr lang="en-US" sz="1400" baseline="30000" dirty="0">
+                <a:latin typeface="Arial" panose="020B0604020202020204" pitchFamily="34" charset="0"/>
+                <a:cs typeface="Arial" panose="020B0604020202020204" pitchFamily="34" charset="0"/>
+              </a:rPr>
+              <a:t>rd</a:t>
+            </a:r>
+            <a:r>
+              <a:rPr lang="en-US" sz="1400" dirty="0">
+                <a:latin typeface="Arial" panose="020B0604020202020204" pitchFamily="34" charset="0"/>
+                <a:cs typeface="Arial" panose="020B0604020202020204" pitchFamily="34" charset="0"/>
+              </a:rPr>
+              <a:t> loc in the sentence as well as the output of the second word.</a:t>
+            </a:r>
+          </a:p>
+          <a:p>
+            <a:pPr marL="0" indent="0">
+              <a:buNone/>
+            </a:pPr>
+            <a:endParaRPr lang="en-US" sz="1400" dirty="0">
+              <a:latin typeface="Arial" panose="020B0604020202020204" pitchFamily="34" charset="0"/>
+              <a:cs typeface="Arial" panose="020B0604020202020204" pitchFamily="34" charset="0"/>
+            </a:endParaRPr>
           </a:p>
         </p:txBody>
       </p:sp>
       <p:pic>
         <p:nvPicPr>
-          <p:cNvPr id="6" name="Picture 5">
-            <a:extLst>
-              <a:ext uri="{FF2B5EF4-FFF2-40B4-BE49-F238E27FC236}">
-                <a16:creationId xmlns:a16="http://schemas.microsoft.com/office/drawing/2014/main" id="{A5DBB38F-CBEA-8C48-8721-8E9D454C3A33}"/>
+          <p:cNvPr id="6" name="Picture 2" descr="A drawing of the information flow in the model">
+            <a:extLst>
+              <a:ext uri="{FF2B5EF4-FFF2-40B4-BE49-F238E27FC236}">
+                <a16:creationId xmlns:a16="http://schemas.microsoft.com/office/drawing/2014/main" id="{556F203C-9E5E-A64A-812F-AC3949D853B1}"/>
               </a:ext>
             </a:extLst>
           </p:cNvPr>
           <p:cNvPicPr>
-            <a:picLocks noChangeAspect="1"/>
+            <a:picLocks noChangeAspect="1" noChangeArrowheads="1"/>
           </p:cNvPicPr>
           <p:nvPr/>
         </p:nvPicPr>
         <p:blipFill>
-          <a:blip r:embed="rId2"/>
+          <a:blip r:embed="rId2">
+            <a:extLst>
+              <a:ext uri="{28A0092B-C50C-407E-A947-70E740481C1C}">
+                <a14:useLocalDpi xmlns:a14="http://schemas.microsoft.com/office/drawing/2010/main" val="0"/>
+              </a:ext>
+            </a:extLst>
+          </a:blip>
+          <a:srcRect/>
           <a:stretch>
             <a:fillRect/>
           </a:stretch>
         </p:blipFill>
-        <p:spPr>
-          <a:xfrm>
-            <a:off x="838200" y="1825625"/>
-            <a:ext cx="8039100" cy="939800"/>
+        <p:spPr bwMode="auto">
+          <a:xfrm>
+            <a:off x="-132627" y="1690688"/>
+            <a:ext cx="4850099" cy="5124097"/>
           </a:xfrm>
           <a:prstGeom prst="rect">
             <a:avLst/>
           </a:prstGeom>
+          <a:noFill/>
+          <a:extLst>
+            <a:ext uri="{909E8E84-426E-40DD-AFC4-6F175D3DCCD1}">
+              <a14:hiddenFill xmlns:a14="http://schemas.microsoft.com/office/drawing/2010/main">
+                <a:solidFill>
+                  <a:srgbClr val="FFFFFF"/>
+                </a:solidFill>
+              </a14:hiddenFill>
+            </a:ext>
+          </a:extLst>
         </p:spPr>
       </p:pic>
       <p:pic>
@@ -10295,7 +12960,7 @@
           <p:cNvPr id="7" name="Picture 6">
             <a:extLst>
               <a:ext uri="{FF2B5EF4-FFF2-40B4-BE49-F238E27FC236}">
-                <a16:creationId xmlns:a16="http://schemas.microsoft.com/office/drawing/2014/main" id="{2879467E-E8E7-2C48-AC7B-0324F3F15581}"/>
+                <a16:creationId xmlns:a16="http://schemas.microsoft.com/office/drawing/2014/main" id="{350C7F16-301A-ED42-BDB9-B5B20C149F50}"/>
               </a:ext>
             </a:extLst>
           </p:cNvPr>
@@ -10312,18 +12977,863 @@
         </p:blipFill>
         <p:spPr>
           <a:xfrm>
-            <a:off x="838200" y="4538661"/>
-            <a:ext cx="6377432" cy="599222"/>
+            <a:off x="5023902" y="1770690"/>
+            <a:ext cx="6781800" cy="2844800"/>
           </a:xfrm>
           <a:prstGeom prst="rect">
             <a:avLst/>
           </a:prstGeom>
         </p:spPr>
       </p:pic>
+      <p:sp>
+        <p:nvSpPr>
+          <p:cNvPr id="3" name="TextBox 2">
+            <a:extLst>
+              <a:ext uri="{FF2B5EF4-FFF2-40B4-BE49-F238E27FC236}">
+                <a16:creationId xmlns:a16="http://schemas.microsoft.com/office/drawing/2014/main" id="{CFEECE96-B40D-B541-B801-5BC054285D84}"/>
+              </a:ext>
+            </a:extLst>
+          </p:cNvPr>
+          <p:cNvSpPr txBox="1"/>
+          <p:nvPr/>
+        </p:nvSpPr>
+        <p:spPr>
+          <a:xfrm>
+            <a:off x="5023902" y="1376291"/>
+            <a:ext cx="3354765" cy="369332"/>
+          </a:xfrm>
+          <a:prstGeom prst="rect">
+            <a:avLst/>
+          </a:prstGeom>
+          <a:noFill/>
+        </p:spPr>
+        <p:txBody>
+          <a:bodyPr wrap="none" rtlCol="0">
+            <a:spAutoFit/>
+          </a:bodyPr>
+          <a:lstStyle/>
+          <a:p>
+            <a:r>
+              <a:rPr lang="en-US" b="1" dirty="0"/>
+              <a:t>RNN – Recurrent Neural Network</a:t>
+            </a:r>
+          </a:p>
+        </p:txBody>
+      </p:sp>
+      <p:sp>
+        <p:nvSpPr>
+          <p:cNvPr id="8" name="Rectangle 7">
+            <a:extLst>
+              <a:ext uri="{FF2B5EF4-FFF2-40B4-BE49-F238E27FC236}">
+                <a16:creationId xmlns:a16="http://schemas.microsoft.com/office/drawing/2014/main" id="{89A78C29-66FB-1641-BC75-C3B0C5C24A98}"/>
+              </a:ext>
+            </a:extLst>
+          </p:cNvPr>
+          <p:cNvSpPr/>
+          <p:nvPr/>
+        </p:nvSpPr>
+        <p:spPr>
+          <a:xfrm>
+            <a:off x="3185839" y="3428999"/>
+            <a:ext cx="1071654" cy="414975"/>
+          </a:xfrm>
+          <a:prstGeom prst="rect">
+            <a:avLst/>
+          </a:prstGeom>
+          <a:noFill/>
+        </p:spPr>
+        <p:style>
+          <a:lnRef idx="2">
+            <a:schemeClr val="accent1">
+              <a:shade val="50000"/>
+            </a:schemeClr>
+          </a:lnRef>
+          <a:fillRef idx="1">
+            <a:schemeClr val="accent1"/>
+          </a:fillRef>
+          <a:effectRef idx="0">
+            <a:schemeClr val="accent1"/>
+          </a:effectRef>
+          <a:fontRef idx="minor">
+            <a:schemeClr val="lt1"/>
+          </a:fontRef>
+        </p:style>
+        <p:txBody>
+          <a:bodyPr rtlCol="0" anchor="ctr"/>
+          <a:lstStyle/>
+          <a:p>
+            <a:pPr algn="ctr"/>
+            <a:endParaRPr lang="en-US"/>
+          </a:p>
+        </p:txBody>
+      </p:sp>
+      <p:sp>
+        <p:nvSpPr>
+          <p:cNvPr id="9" name="TextBox 8">
+            <a:extLst>
+              <a:ext uri="{FF2B5EF4-FFF2-40B4-BE49-F238E27FC236}">
+                <a16:creationId xmlns:a16="http://schemas.microsoft.com/office/drawing/2014/main" id="{6940E9CB-5FAC-5545-BF51-BEDD96B5B00B}"/>
+              </a:ext>
+            </a:extLst>
+          </p:cNvPr>
+          <p:cNvSpPr txBox="1"/>
+          <p:nvPr/>
+        </p:nvSpPr>
+        <p:spPr>
+          <a:xfrm>
+            <a:off x="2556826" y="5503873"/>
+            <a:ext cx="418704" cy="369332"/>
+          </a:xfrm>
+          <a:prstGeom prst="rect">
+            <a:avLst/>
+          </a:prstGeom>
+          <a:noFill/>
+        </p:spPr>
+        <p:txBody>
+          <a:bodyPr wrap="none" rtlCol="0">
+            <a:spAutoFit/>
+          </a:bodyPr>
+          <a:lstStyle/>
+          <a:p>
+            <a:r>
+              <a:rPr lang="en-US" dirty="0"/>
+              <a:t>64</a:t>
+            </a:r>
+          </a:p>
+        </p:txBody>
+      </p:sp>
+      <p:sp>
+        <p:nvSpPr>
+          <p:cNvPr id="10" name="TextBox 9">
+            <a:extLst>
+              <a:ext uri="{FF2B5EF4-FFF2-40B4-BE49-F238E27FC236}">
+                <a16:creationId xmlns:a16="http://schemas.microsoft.com/office/drawing/2014/main" id="{7805632F-21A5-2241-8C16-767CD8305A88}"/>
+              </a:ext>
+            </a:extLst>
+          </p:cNvPr>
+          <p:cNvSpPr txBox="1"/>
+          <p:nvPr/>
+        </p:nvSpPr>
+        <p:spPr>
+          <a:xfrm>
+            <a:off x="2511941" y="6231898"/>
+            <a:ext cx="508473" cy="369332"/>
+          </a:xfrm>
+          <a:prstGeom prst="rect">
+            <a:avLst/>
+          </a:prstGeom>
+          <a:noFill/>
+        </p:spPr>
+        <p:txBody>
+          <a:bodyPr wrap="none" rtlCol="0">
+            <a:spAutoFit/>
+          </a:bodyPr>
+          <a:lstStyle/>
+          <a:p>
+            <a:r>
+              <a:rPr lang="en-US" dirty="0"/>
+              <a:t>0/1</a:t>
+            </a:r>
+          </a:p>
+        </p:txBody>
+      </p:sp>
+      <p:sp>
+        <p:nvSpPr>
+          <p:cNvPr id="11" name="TextBox 10">
+            <a:extLst>
+              <a:ext uri="{FF2B5EF4-FFF2-40B4-BE49-F238E27FC236}">
+                <a16:creationId xmlns:a16="http://schemas.microsoft.com/office/drawing/2014/main" id="{903291D7-D4C0-1D42-9280-E47F102C8C0D}"/>
+              </a:ext>
+            </a:extLst>
+          </p:cNvPr>
+          <p:cNvSpPr txBox="1"/>
+          <p:nvPr/>
+        </p:nvSpPr>
+        <p:spPr>
+          <a:xfrm>
+            <a:off x="1654975" y="1549690"/>
+            <a:ext cx="1111202" cy="369332"/>
+          </a:xfrm>
+          <a:prstGeom prst="rect">
+            <a:avLst/>
+          </a:prstGeom>
+          <a:noFill/>
+        </p:spPr>
+        <p:txBody>
+          <a:bodyPr wrap="none" rtlCol="0">
+            <a:spAutoFit/>
+          </a:bodyPr>
+          <a:lstStyle/>
+          <a:p>
+            <a:r>
+              <a:rPr lang="en-US" dirty="0">
+                <a:solidFill>
+                  <a:srgbClr val="FF0000"/>
+                </a:solidFill>
+              </a:rPr>
+              <a:t>bad = 120</a:t>
+            </a:r>
+          </a:p>
+        </p:txBody>
+      </p:sp>
+      <p:sp>
+        <p:nvSpPr>
+          <p:cNvPr id="12" name="TextBox 11">
+            <a:extLst>
+              <a:ext uri="{FF2B5EF4-FFF2-40B4-BE49-F238E27FC236}">
+                <a16:creationId xmlns:a16="http://schemas.microsoft.com/office/drawing/2014/main" id="{EE61B60E-90A1-B948-93DA-32731057AF74}"/>
+              </a:ext>
+            </a:extLst>
+          </p:cNvPr>
+          <p:cNvSpPr txBox="1"/>
+          <p:nvPr/>
+        </p:nvSpPr>
+        <p:spPr>
+          <a:xfrm>
+            <a:off x="0" y="3664329"/>
+            <a:ext cx="3143809" cy="261610"/>
+          </a:xfrm>
+          <a:prstGeom prst="rect">
+            <a:avLst/>
+          </a:prstGeom>
+          <a:noFill/>
+        </p:spPr>
+        <p:txBody>
+          <a:bodyPr wrap="none" rtlCol="0">
+            <a:spAutoFit/>
+          </a:bodyPr>
+          <a:lstStyle/>
+          <a:p>
+            <a:r>
+              <a:rPr lang="en-US" sz="1100" dirty="0"/>
+              <a:t>1x64  [………..]   [………..]   [………..]  </a:t>
+            </a:r>
+            <a:r>
+              <a:rPr lang="en-US" sz="1100" dirty="0">
+                <a:highlight>
+                  <a:srgbClr val="00FF00"/>
+                </a:highlight>
+              </a:rPr>
+              <a:t>[………..]</a:t>
+            </a:r>
+            <a:r>
+              <a:rPr lang="en-US" sz="1100" dirty="0"/>
+              <a:t>   [………..]</a:t>
+            </a:r>
+          </a:p>
+        </p:txBody>
+      </p:sp>
+      <p:sp>
+        <p:nvSpPr>
+          <p:cNvPr id="13" name="TextBox 12">
+            <a:extLst>
+              <a:ext uri="{FF2B5EF4-FFF2-40B4-BE49-F238E27FC236}">
+                <a16:creationId xmlns:a16="http://schemas.microsoft.com/office/drawing/2014/main" id="{BBDEE982-4379-4E48-B00F-E44B5E704BA7}"/>
+              </a:ext>
+            </a:extLst>
+          </p:cNvPr>
+          <p:cNvSpPr txBox="1"/>
+          <p:nvPr/>
+        </p:nvSpPr>
+        <p:spPr>
+          <a:xfrm>
+            <a:off x="4918364" y="6231898"/>
+            <a:ext cx="5291128" cy="369332"/>
+          </a:xfrm>
+          <a:prstGeom prst="rect">
+            <a:avLst/>
+          </a:prstGeom>
+          <a:noFill/>
+        </p:spPr>
+        <p:txBody>
+          <a:bodyPr wrap="none" rtlCol="0">
+            <a:spAutoFit/>
+          </a:bodyPr>
+          <a:lstStyle/>
+          <a:p>
+            <a:r>
+              <a:rPr lang="en-US" b="1" dirty="0"/>
+              <a:t>Word2Vec</a:t>
+            </a:r>
+            <a:r>
+              <a:rPr lang="en-US" dirty="0"/>
+              <a:t> – Package by Google to create Embeddings.</a:t>
+            </a:r>
+          </a:p>
+        </p:txBody>
+      </p:sp>
+      <p:sp>
+        <p:nvSpPr>
+          <p:cNvPr id="14" name="TextBox 13">
+            <a:extLst>
+              <a:ext uri="{FF2B5EF4-FFF2-40B4-BE49-F238E27FC236}">
+                <a16:creationId xmlns:a16="http://schemas.microsoft.com/office/drawing/2014/main" id="{627C3415-1F77-5F44-8BEF-C750A40A23A0}"/>
+              </a:ext>
+            </a:extLst>
+          </p:cNvPr>
+          <p:cNvSpPr txBox="1"/>
+          <p:nvPr/>
+        </p:nvSpPr>
+        <p:spPr>
+          <a:xfrm>
+            <a:off x="576597" y="4186612"/>
+            <a:ext cx="301686" cy="369332"/>
+          </a:xfrm>
+          <a:prstGeom prst="rect">
+            <a:avLst/>
+          </a:prstGeom>
+          <a:noFill/>
+        </p:spPr>
+        <p:txBody>
+          <a:bodyPr wrap="none" rtlCol="0">
+            <a:spAutoFit/>
+          </a:bodyPr>
+          <a:lstStyle/>
+          <a:p>
+            <a:r>
+              <a:rPr lang="en-US" dirty="0">
+                <a:solidFill>
+                  <a:srgbClr val="FF0000"/>
+                </a:solidFill>
+              </a:rPr>
+              <a:t>1</a:t>
+            </a:r>
+          </a:p>
+        </p:txBody>
+      </p:sp>
+      <p:sp>
+        <p:nvSpPr>
+          <p:cNvPr id="15" name="TextBox 14">
+            <a:extLst>
+              <a:ext uri="{FF2B5EF4-FFF2-40B4-BE49-F238E27FC236}">
+                <a16:creationId xmlns:a16="http://schemas.microsoft.com/office/drawing/2014/main" id="{0EC9CE43-C0C5-3549-AB73-298A39B9D4C4}"/>
+              </a:ext>
+            </a:extLst>
+          </p:cNvPr>
+          <p:cNvSpPr txBox="1"/>
+          <p:nvPr/>
+        </p:nvSpPr>
+        <p:spPr>
+          <a:xfrm>
+            <a:off x="1108295" y="4182205"/>
+            <a:ext cx="301686" cy="369332"/>
+          </a:xfrm>
+          <a:prstGeom prst="rect">
+            <a:avLst/>
+          </a:prstGeom>
+          <a:noFill/>
+        </p:spPr>
+        <p:txBody>
+          <a:bodyPr wrap="none" rtlCol="0">
+            <a:spAutoFit/>
+          </a:bodyPr>
+          <a:lstStyle/>
+          <a:p>
+            <a:r>
+              <a:rPr lang="en-US" dirty="0">
+                <a:solidFill>
+                  <a:srgbClr val="FF0000"/>
+                </a:solidFill>
+              </a:rPr>
+              <a:t>2</a:t>
+            </a:r>
+          </a:p>
+        </p:txBody>
+      </p:sp>
+      <p:sp>
+        <p:nvSpPr>
+          <p:cNvPr id="16" name="TextBox 15">
+            <a:extLst>
+              <a:ext uri="{FF2B5EF4-FFF2-40B4-BE49-F238E27FC236}">
+                <a16:creationId xmlns:a16="http://schemas.microsoft.com/office/drawing/2014/main" id="{B996DC25-7F7F-5240-89D7-301B6CA2CCF5}"/>
+              </a:ext>
+            </a:extLst>
+          </p:cNvPr>
+          <p:cNvSpPr txBox="1"/>
+          <p:nvPr/>
+        </p:nvSpPr>
+        <p:spPr>
+          <a:xfrm>
+            <a:off x="1642426" y="4186612"/>
+            <a:ext cx="301686" cy="369332"/>
+          </a:xfrm>
+          <a:prstGeom prst="rect">
+            <a:avLst/>
+          </a:prstGeom>
+          <a:noFill/>
+        </p:spPr>
+        <p:txBody>
+          <a:bodyPr wrap="none" rtlCol="0">
+            <a:spAutoFit/>
+          </a:bodyPr>
+          <a:lstStyle/>
+          <a:p>
+            <a:r>
+              <a:rPr lang="en-US" dirty="0">
+                <a:solidFill>
+                  <a:srgbClr val="FF0000"/>
+                </a:solidFill>
+              </a:rPr>
+              <a:t>3</a:t>
+            </a:r>
+          </a:p>
+        </p:txBody>
+      </p:sp>
+      <p:sp>
+        <p:nvSpPr>
+          <p:cNvPr id="17" name="TextBox 16">
+            <a:extLst>
+              <a:ext uri="{FF2B5EF4-FFF2-40B4-BE49-F238E27FC236}">
+                <a16:creationId xmlns:a16="http://schemas.microsoft.com/office/drawing/2014/main" id="{6DAC45DA-8CFA-FB48-BA11-4660E51AF2BD}"/>
+              </a:ext>
+            </a:extLst>
+          </p:cNvPr>
+          <p:cNvSpPr txBox="1"/>
+          <p:nvPr/>
+        </p:nvSpPr>
+        <p:spPr>
+          <a:xfrm>
+            <a:off x="2167298" y="4186638"/>
+            <a:ext cx="301686" cy="369332"/>
+          </a:xfrm>
+          <a:prstGeom prst="rect">
+            <a:avLst/>
+          </a:prstGeom>
+          <a:noFill/>
+        </p:spPr>
+        <p:txBody>
+          <a:bodyPr wrap="none" rtlCol="0">
+            <a:spAutoFit/>
+          </a:bodyPr>
+          <a:lstStyle/>
+          <a:p>
+            <a:r>
+              <a:rPr lang="en-US" dirty="0">
+                <a:solidFill>
+                  <a:srgbClr val="FF0000"/>
+                </a:solidFill>
+              </a:rPr>
+              <a:t>4</a:t>
+            </a:r>
+          </a:p>
+        </p:txBody>
+      </p:sp>
+      <p:sp>
+        <p:nvSpPr>
+          <p:cNvPr id="18" name="TextBox 17">
+            <a:extLst>
+              <a:ext uri="{FF2B5EF4-FFF2-40B4-BE49-F238E27FC236}">
+                <a16:creationId xmlns:a16="http://schemas.microsoft.com/office/drawing/2014/main" id="{69D69932-FE55-BB4A-8C86-56547E26A7F3}"/>
+              </a:ext>
+            </a:extLst>
+          </p:cNvPr>
+          <p:cNvSpPr txBox="1"/>
+          <p:nvPr/>
+        </p:nvSpPr>
+        <p:spPr>
+          <a:xfrm>
+            <a:off x="2703124" y="4190454"/>
+            <a:ext cx="301686" cy="369332"/>
+          </a:xfrm>
+          <a:prstGeom prst="rect">
+            <a:avLst/>
+          </a:prstGeom>
+          <a:noFill/>
+        </p:spPr>
+        <p:txBody>
+          <a:bodyPr wrap="none" rtlCol="0">
+            <a:spAutoFit/>
+          </a:bodyPr>
+          <a:lstStyle/>
+          <a:p>
+            <a:r>
+              <a:rPr lang="en-US" dirty="0">
+                <a:solidFill>
+                  <a:srgbClr val="FF0000"/>
+                </a:solidFill>
+              </a:rPr>
+              <a:t>5</a:t>
+            </a:r>
+          </a:p>
+        </p:txBody>
+      </p:sp>
+      <p:sp>
+        <p:nvSpPr>
+          <p:cNvPr id="19" name="TextBox 18">
+            <a:extLst>
+              <a:ext uri="{FF2B5EF4-FFF2-40B4-BE49-F238E27FC236}">
+                <a16:creationId xmlns:a16="http://schemas.microsoft.com/office/drawing/2014/main" id="{F272C074-F3FE-FB4A-9F88-3CF9E30CA0D7}"/>
+              </a:ext>
+            </a:extLst>
+          </p:cNvPr>
+          <p:cNvSpPr txBox="1"/>
+          <p:nvPr/>
+        </p:nvSpPr>
+        <p:spPr>
+          <a:xfrm>
+            <a:off x="421242" y="3810458"/>
+            <a:ext cx="604140" cy="369332"/>
+          </a:xfrm>
+          <a:prstGeom prst="rect">
+            <a:avLst/>
+          </a:prstGeom>
+          <a:noFill/>
+        </p:spPr>
+        <p:txBody>
+          <a:bodyPr wrap="none" rtlCol="0">
+            <a:spAutoFit/>
+          </a:bodyPr>
+          <a:lstStyle/>
+          <a:p>
+            <a:r>
+              <a:rPr lang="en-US" dirty="0">
+                <a:solidFill>
+                  <a:schemeClr val="accent2"/>
+                </a:solidFill>
+              </a:rPr>
+              <a:t>That</a:t>
+            </a:r>
+          </a:p>
+        </p:txBody>
+      </p:sp>
+      <p:sp>
+        <p:nvSpPr>
+          <p:cNvPr id="20" name="TextBox 19">
+            <a:extLst>
+              <a:ext uri="{FF2B5EF4-FFF2-40B4-BE49-F238E27FC236}">
+                <a16:creationId xmlns:a16="http://schemas.microsoft.com/office/drawing/2014/main" id="{03AAE6AE-3ECF-E347-B163-D4322272EA47}"/>
+              </a:ext>
+            </a:extLst>
+          </p:cNvPr>
+          <p:cNvSpPr txBox="1"/>
+          <p:nvPr/>
+        </p:nvSpPr>
+        <p:spPr>
+          <a:xfrm>
+            <a:off x="1008747" y="3817280"/>
+            <a:ext cx="558871" cy="369332"/>
+          </a:xfrm>
+          <a:prstGeom prst="rect">
+            <a:avLst/>
+          </a:prstGeom>
+          <a:noFill/>
+        </p:spPr>
+        <p:txBody>
+          <a:bodyPr wrap="none" rtlCol="0">
+            <a:spAutoFit/>
+          </a:bodyPr>
+          <a:lstStyle/>
+          <a:p>
+            <a:r>
+              <a:rPr lang="en-US" b="1" dirty="0">
+                <a:solidFill>
+                  <a:schemeClr val="accent2"/>
+                </a:solidFill>
+              </a:rPr>
+              <a:t>was</a:t>
+            </a:r>
+          </a:p>
+        </p:txBody>
+      </p:sp>
+      <p:cxnSp>
+        <p:nvCxnSpPr>
+          <p:cNvPr id="22" name="Straight Arrow Connector 21">
+            <a:extLst>
+              <a:ext uri="{FF2B5EF4-FFF2-40B4-BE49-F238E27FC236}">
+                <a16:creationId xmlns:a16="http://schemas.microsoft.com/office/drawing/2014/main" id="{1864890D-3965-E142-A803-C9E03470D54E}"/>
+              </a:ext>
+            </a:extLst>
+          </p:cNvPr>
+          <p:cNvCxnSpPr>
+            <a:cxnSpLocks/>
+          </p:cNvCxnSpPr>
+          <p:nvPr/>
+        </p:nvCxnSpPr>
+        <p:spPr>
+          <a:xfrm>
+            <a:off x="895491" y="4114091"/>
+            <a:ext cx="200892" cy="1417"/>
+          </a:xfrm>
+          <a:prstGeom prst="straightConnector1">
+            <a:avLst/>
+          </a:prstGeom>
+          <a:ln>
+            <a:tailEnd type="triangle"/>
+          </a:ln>
+        </p:spPr>
+        <p:style>
+          <a:lnRef idx="1">
+            <a:schemeClr val="accent1"/>
+          </a:lnRef>
+          <a:fillRef idx="0">
+            <a:schemeClr val="accent1"/>
+          </a:fillRef>
+          <a:effectRef idx="0">
+            <a:schemeClr val="accent1"/>
+          </a:effectRef>
+          <a:fontRef idx="minor">
+            <a:schemeClr val="tx1"/>
+          </a:fontRef>
+        </p:style>
+      </p:cxnSp>
+      <p:sp>
+        <p:nvSpPr>
+          <p:cNvPr id="23" name="TextBox 22">
+            <a:extLst>
+              <a:ext uri="{FF2B5EF4-FFF2-40B4-BE49-F238E27FC236}">
+                <a16:creationId xmlns:a16="http://schemas.microsoft.com/office/drawing/2014/main" id="{DBE4D0E0-4A86-E648-9408-C074FB4B6902}"/>
+              </a:ext>
+            </a:extLst>
+          </p:cNvPr>
+          <p:cNvSpPr txBox="1"/>
+          <p:nvPr/>
+        </p:nvSpPr>
+        <p:spPr>
+          <a:xfrm>
+            <a:off x="8825810" y="1250857"/>
+            <a:ext cx="2837252" cy="369332"/>
+          </a:xfrm>
+          <a:prstGeom prst="rect">
+            <a:avLst/>
+          </a:prstGeom>
+          <a:noFill/>
+        </p:spPr>
+        <p:txBody>
+          <a:bodyPr wrap="none" rtlCol="0">
+            <a:spAutoFit/>
+          </a:bodyPr>
+          <a:lstStyle/>
+          <a:p>
+            <a:r>
+              <a:rPr lang="en-US" dirty="0"/>
+              <a:t>“the </a:t>
+            </a:r>
+            <a:r>
+              <a:rPr lang="en-US" dirty="0">
+                <a:highlight>
+                  <a:srgbClr val="00FF00"/>
+                </a:highlight>
+              </a:rPr>
+              <a:t>chicken</a:t>
+            </a:r>
+            <a:r>
+              <a:rPr lang="en-US" dirty="0"/>
+              <a:t> is ready to </a:t>
+            </a:r>
+            <a:r>
+              <a:rPr lang="en-US" dirty="0">
+                <a:highlight>
+                  <a:srgbClr val="008080"/>
+                </a:highlight>
+              </a:rPr>
+              <a:t>eat</a:t>
+            </a:r>
+            <a:r>
+              <a:rPr lang="en-US" dirty="0"/>
+              <a:t>”</a:t>
+            </a:r>
+          </a:p>
+        </p:txBody>
+      </p:sp>
+      <p:sp>
+        <p:nvSpPr>
+          <p:cNvPr id="24" name="TextBox 23">
+            <a:extLst>
+              <a:ext uri="{FF2B5EF4-FFF2-40B4-BE49-F238E27FC236}">
+                <a16:creationId xmlns:a16="http://schemas.microsoft.com/office/drawing/2014/main" id="{BFEACA65-E4B3-F74C-B0EC-8A0230B1A93A}"/>
+              </a:ext>
+            </a:extLst>
+          </p:cNvPr>
+          <p:cNvSpPr txBox="1"/>
+          <p:nvPr/>
+        </p:nvSpPr>
+        <p:spPr>
+          <a:xfrm>
+            <a:off x="419344" y="4728263"/>
+            <a:ext cx="301686" cy="369332"/>
+          </a:xfrm>
+          <a:prstGeom prst="rect">
+            <a:avLst/>
+          </a:prstGeom>
+          <a:noFill/>
+        </p:spPr>
+        <p:txBody>
+          <a:bodyPr wrap="none" rtlCol="0">
+            <a:spAutoFit/>
+          </a:bodyPr>
+          <a:lstStyle/>
+          <a:p>
+            <a:r>
+              <a:rPr lang="en-US" dirty="0">
+                <a:solidFill>
+                  <a:srgbClr val="FF0000"/>
+                </a:solidFill>
+              </a:rPr>
+              <a:t>1</a:t>
+            </a:r>
+          </a:p>
+        </p:txBody>
+      </p:sp>
+      <p:sp>
+        <p:nvSpPr>
+          <p:cNvPr id="25" name="TextBox 24">
+            <a:extLst>
+              <a:ext uri="{FF2B5EF4-FFF2-40B4-BE49-F238E27FC236}">
+                <a16:creationId xmlns:a16="http://schemas.microsoft.com/office/drawing/2014/main" id="{BF2B6FCE-8140-D146-A468-DCC7C0464DA3}"/>
+              </a:ext>
+            </a:extLst>
+          </p:cNvPr>
+          <p:cNvSpPr txBox="1"/>
+          <p:nvPr/>
+        </p:nvSpPr>
+        <p:spPr>
+          <a:xfrm>
+            <a:off x="951042" y="4723856"/>
+            <a:ext cx="301686" cy="369332"/>
+          </a:xfrm>
+          <a:prstGeom prst="rect">
+            <a:avLst/>
+          </a:prstGeom>
+          <a:noFill/>
+        </p:spPr>
+        <p:txBody>
+          <a:bodyPr wrap="none" rtlCol="0">
+            <a:spAutoFit/>
+          </a:bodyPr>
+          <a:lstStyle/>
+          <a:p>
+            <a:r>
+              <a:rPr lang="en-US" dirty="0">
+                <a:solidFill>
+                  <a:srgbClr val="FF0000"/>
+                </a:solidFill>
+              </a:rPr>
+              <a:t>2</a:t>
+            </a:r>
+          </a:p>
+        </p:txBody>
+      </p:sp>
+      <p:sp>
+        <p:nvSpPr>
+          <p:cNvPr id="26" name="TextBox 25">
+            <a:extLst>
+              <a:ext uri="{FF2B5EF4-FFF2-40B4-BE49-F238E27FC236}">
+                <a16:creationId xmlns:a16="http://schemas.microsoft.com/office/drawing/2014/main" id="{5F23C3CD-9377-A149-98F2-A0B1F7020592}"/>
+              </a:ext>
+            </a:extLst>
+          </p:cNvPr>
+          <p:cNvSpPr txBox="1"/>
+          <p:nvPr/>
+        </p:nvSpPr>
+        <p:spPr>
+          <a:xfrm>
+            <a:off x="1485173" y="4728263"/>
+            <a:ext cx="301686" cy="369332"/>
+          </a:xfrm>
+          <a:prstGeom prst="rect">
+            <a:avLst/>
+          </a:prstGeom>
+          <a:noFill/>
+        </p:spPr>
+        <p:txBody>
+          <a:bodyPr wrap="none" rtlCol="0">
+            <a:spAutoFit/>
+          </a:bodyPr>
+          <a:lstStyle/>
+          <a:p>
+            <a:r>
+              <a:rPr lang="en-US" dirty="0">
+                <a:solidFill>
+                  <a:srgbClr val="FF0000"/>
+                </a:solidFill>
+              </a:rPr>
+              <a:t>3</a:t>
+            </a:r>
+          </a:p>
+        </p:txBody>
+      </p:sp>
+      <p:sp>
+        <p:nvSpPr>
+          <p:cNvPr id="27" name="TextBox 26">
+            <a:extLst>
+              <a:ext uri="{FF2B5EF4-FFF2-40B4-BE49-F238E27FC236}">
+                <a16:creationId xmlns:a16="http://schemas.microsoft.com/office/drawing/2014/main" id="{DD324CDC-6A14-D844-97A4-78E32C10A6AB}"/>
+              </a:ext>
+            </a:extLst>
+          </p:cNvPr>
+          <p:cNvSpPr txBox="1"/>
+          <p:nvPr/>
+        </p:nvSpPr>
+        <p:spPr>
+          <a:xfrm>
+            <a:off x="2010045" y="4728289"/>
+            <a:ext cx="301686" cy="369332"/>
+          </a:xfrm>
+          <a:prstGeom prst="rect">
+            <a:avLst/>
+          </a:prstGeom>
+          <a:noFill/>
+        </p:spPr>
+        <p:txBody>
+          <a:bodyPr wrap="none" rtlCol="0">
+            <a:spAutoFit/>
+          </a:bodyPr>
+          <a:lstStyle/>
+          <a:p>
+            <a:r>
+              <a:rPr lang="en-US" dirty="0">
+                <a:solidFill>
+                  <a:srgbClr val="FF0000"/>
+                </a:solidFill>
+              </a:rPr>
+              <a:t>4</a:t>
+            </a:r>
+          </a:p>
+        </p:txBody>
+      </p:sp>
+      <p:sp>
+        <p:nvSpPr>
+          <p:cNvPr id="28" name="TextBox 27">
+            <a:extLst>
+              <a:ext uri="{FF2B5EF4-FFF2-40B4-BE49-F238E27FC236}">
+                <a16:creationId xmlns:a16="http://schemas.microsoft.com/office/drawing/2014/main" id="{B8D0FC6F-DDF1-814C-8B6A-AEE653D07AC9}"/>
+              </a:ext>
+            </a:extLst>
+          </p:cNvPr>
+          <p:cNvSpPr txBox="1"/>
+          <p:nvPr/>
+        </p:nvSpPr>
+        <p:spPr>
+          <a:xfrm>
+            <a:off x="2545871" y="4732105"/>
+            <a:ext cx="301686" cy="369332"/>
+          </a:xfrm>
+          <a:prstGeom prst="rect">
+            <a:avLst/>
+          </a:prstGeom>
+          <a:noFill/>
+        </p:spPr>
+        <p:txBody>
+          <a:bodyPr wrap="none" rtlCol="0">
+            <a:spAutoFit/>
+          </a:bodyPr>
+          <a:lstStyle/>
+          <a:p>
+            <a:r>
+              <a:rPr lang="en-US" dirty="0">
+                <a:solidFill>
+                  <a:srgbClr val="FF0000"/>
+                </a:solidFill>
+              </a:rPr>
+              <a:t>5</a:t>
+            </a:r>
+          </a:p>
+        </p:txBody>
+      </p:sp>
     </p:spTree>
     <p:extLst>
       <p:ext uri="{BB962C8B-B14F-4D97-AF65-F5344CB8AC3E}">
-        <p14:creationId xmlns:p14="http://schemas.microsoft.com/office/powerpoint/2010/main" val="295500195"/>
+        <p14:creationId xmlns:p14="http://schemas.microsoft.com/office/powerpoint/2010/main" val="2176830275"/>
       </p:ext>
     </p:extLst>
   </p:cSld>

</xml_diff>